<commit_message>
Update cheatsheet for 1.6.1.
</commit_message>
<xml_diff>
--- a/misc/collapse cheat sheet/collapse.pptx
+++ b/misc/collapse cheat sheet/collapse.pptx
@@ -2206,7 +2206,7 @@
           </a:ln>
           <a:extLst>
             <a:ext uri="{C572A759-6A51-4108-AA02-DFA0A04FC94B}">
-              <ma14:wrappingTextBoxFlag xmlns:ma14="http://schemas.microsoft.com/office/mac/drawingml/2011/main" xmlns:a14="http://schemas.microsoft.com/office/drawing/2010/main" xmlns:m="http://schemas.openxmlformats.org/officeDocument/2006/math" xmlns="" val="1"/>
+              <ma14:wrappingTextBoxFlag xmlns="" xmlns:m="http://schemas.openxmlformats.org/officeDocument/2006/math" xmlns:a14="http://schemas.microsoft.com/office/drawing/2010/main" xmlns:ma14="http://schemas.microsoft.com/office/mac/drawingml/2011/main" val="1"/>
             </a:ext>
           </a:extLst>
         </p:spPr>
@@ -2245,7 +2245,7 @@
           </a:ln>
           <a:extLst>
             <a:ext uri="{C572A759-6A51-4108-AA02-DFA0A04FC94B}">
-              <ma14:wrappingTextBoxFlag xmlns:ma14="http://schemas.microsoft.com/office/mac/drawingml/2011/main" xmlns:a14="http://schemas.microsoft.com/office/drawing/2010/main" xmlns:m="http://schemas.openxmlformats.org/officeDocument/2006/math" xmlns="" val="1"/>
+              <ma14:wrappingTextBoxFlag xmlns="" xmlns:m="http://schemas.openxmlformats.org/officeDocument/2006/math" xmlns:a14="http://schemas.microsoft.com/office/drawing/2010/main" xmlns:ma14="http://schemas.microsoft.com/office/mac/drawingml/2011/main" val="1"/>
             </a:ext>
           </a:extLst>
         </p:spPr>
@@ -4088,7 +4088,7 @@
         <p:spPr>
           <a:xfrm>
             <a:off x="3738753" y="1380557"/>
-            <a:ext cx="3214949" cy="8553111"/>
+            <a:ext cx="3214949" cy="8522333"/>
           </a:xfrm>
           <a:prstGeom prst="rect">
             <a:avLst/>
@@ -4098,7 +4098,7 @@
           </a:ln>
           <a:extLst>
             <a:ext uri="{C572A759-6A51-4108-AA02-DFA0A04FC94B}">
-              <ma14:wrappingTextBoxFlag xmlns:ma14="http://schemas.microsoft.com/office/mac/drawingml/2011/main" xmlns:a14="http://schemas.microsoft.com/office/drawing/2010/main" xmlns:m="http://schemas.openxmlformats.org/officeDocument/2006/math" xmlns="" val="1"/>
+              <ma14:wrappingTextBoxFlag xmlns="" xmlns:m="http://schemas.openxmlformats.org/officeDocument/2006/math" xmlns:a14="http://schemas.microsoft.com/office/drawing/2010/main" xmlns:ma14="http://schemas.microsoft.com/office/mac/drawingml/2011/main" val="1"/>
             </a:ext>
           </a:extLst>
         </p:spPr>
@@ -4536,14 +4536,14 @@
               </a:defRPr>
             </a:pPr>
             <a:r>
-              <a:rPr lang="en-US" sz="900" dirty="0" smtClean="0">
+              <a:rPr lang="en-US" sz="900" dirty="0" err="1" smtClean="0">
                 <a:solidFill>
                   <a:srgbClr val="000000"/>
                 </a:solidFill>
                 <a:latin typeface="Lucida Console" panose="020B0609040504020204" pitchFamily="49" charset="0"/>
                 <a:sym typeface="Source Sans Pro Light"/>
               </a:rPr>
-              <a:t>fHDwithin</a:t>
+              <a:t>fhdwithin</a:t>
             </a:r>
             <a:r>
               <a:rPr lang="en-US" sz="900" b="0" dirty="0" smtClean="0">
@@ -4618,14 +4618,14 @@
               </a:defRPr>
             </a:pPr>
             <a:r>
-              <a:rPr lang="en-US" sz="900" dirty="0" smtClean="0">
+              <a:rPr lang="en-US" sz="900" dirty="0" err="1" smtClean="0">
                 <a:solidFill>
                   <a:srgbClr val="000000"/>
                 </a:solidFill>
                 <a:latin typeface="Lucida Console" panose="020B0609040504020204" pitchFamily="49" charset="0"/>
                 <a:sym typeface="Source Sans Pro Light"/>
               </a:rPr>
-              <a:t>fHDbetween</a:t>
+              <a:t>fhdbetween</a:t>
             </a:r>
             <a:r>
               <a:rPr lang="en-US" sz="900" b="0" dirty="0" smtClean="0">
@@ -4671,7 +4671,7 @@
                 <a:latin typeface="Lucida Console" panose="020B0609040504020204" pitchFamily="49" charset="0"/>
                 <a:sym typeface="Source Sans Pro Light"/>
               </a:rPr>
-              <a:t>      fill = FALSE, variable.wise = FALSE, .)</a:t>
+              <a:t>      fill = FALSE, variable.wise = FALSE, )</a:t>
             </a:r>
           </a:p>
           <a:p>
@@ -4990,7 +4990,7 @@
                 <a:latin typeface="Lucida Console" panose="020B0609040504020204" pitchFamily="49" charset="0"/>
                 <a:sym typeface="Source Sans Pro Light"/>
               </a:rPr>
-              <a:t>c(‘lm’,’solve’,’qr’,’arma’,’chol’,’eigen’), .</a:t>
+              <a:t>c(‘lm’,’solve’,’qr’,’arma’,’chol’,’eigen’), </a:t>
             </a:r>
             <a:r>
               <a:rPr lang="en-US" sz="900" b="0" dirty="0" smtClean="0">
@@ -5125,7 +5125,7 @@
                 <a:latin typeface="Lucida Console" panose="020B0609040504020204" pitchFamily="49" charset="0"/>
                 <a:sym typeface="Source Sans Pro Light"/>
               </a:rPr>
-              <a:t>fFtest(y, exc, X = NULL, full.df = TRUE, ...)</a:t>
+              <a:t>fFtest(y, exc, X = NULL, w = NULL, ...)</a:t>
             </a:r>
           </a:p>
           <a:p>
@@ -5429,7 +5429,7 @@
                 <a:latin typeface="Lucida Console" panose="020B0609040504020204" pitchFamily="49" charset="0"/>
                 <a:sym typeface="Source Sans Pro Light"/>
               </a:rPr>
-              <a:t>flag(x, n = 1, g = NULL, t = NULL, fill = NA,.)</a:t>
+              <a:t>flag(x, n = 1, g = NULL, t = NULL, fill = NA, )</a:t>
             </a:r>
           </a:p>
           <a:p>
@@ -5689,7 +5689,7 @@
                 <a:cs typeface="+mn-cs"/>
                 <a:sym typeface="Source Sans Pro Light"/>
               </a:rPr>
-              <a:t>Operators:  </a:t>
+              <a:t>Operators:   </a:t>
             </a:r>
             <a:r>
               <a:rPr lang="en-US" sz="900" b="0" dirty="0" smtClean="0">
@@ -5728,19 +5728,7 @@
               </a:defRPr>
             </a:pPr>
             <a:r>
-              <a:rPr lang="en-US" sz="1100" i="1" dirty="0" smtClean="0">
-                <a:solidFill>
-                  <a:srgbClr val="000000"/>
-                </a:solidFill>
-                <a:latin typeface="Source Sans Pro" panose="020B0503030403020204" pitchFamily="34" charset="0"/>
-                <a:ea typeface="Source Sans Pro" panose="020B0503030403020204" pitchFamily="34" charset="0"/>
-                <a:cs typeface="+mn-cs"/>
-                <a:sym typeface="Source Sans Pro Light"/>
-              </a:rPr>
-              <a:t>Note: </a:t>
-            </a:r>
-            <a:r>
-              <a:rPr lang="en-US" sz="1100" b="0" dirty="0" smtClean="0">
+              <a:rPr lang="en-US" sz="1100" b="0" dirty="0">
                 <a:solidFill>
                   <a:srgbClr val="000000"/>
                 </a:solidFill>
@@ -5749,17 +5737,55 @@
                 <a:cs typeface="+mn-cs"/>
                 <a:sym typeface="Source Sans Pro Light"/>
               </a:rPr>
-              <a:t>for Irregular time series and panels see </a:t>
-            </a:r>
-            <a:r>
-              <a:rPr lang="en-US" sz="900" b="0" dirty="0" smtClean="0">
+              <a:t>Cumulative Sums:  </a:t>
+            </a:r>
+            <a:r>
+              <a:rPr lang="de-DE" sz="900" b="0" dirty="0" err="1" smtClean="0">
                 <a:solidFill>
                   <a:srgbClr val="000000"/>
                 </a:solidFill>
                 <a:latin typeface="Lucida Console" panose="020B0609040504020204" pitchFamily="49" charset="0"/>
+                <a:ea typeface="+mn-ea"/>
+                <a:cs typeface="+mn-cs"/>
                 <a:sym typeface="Source Sans Pro Light"/>
               </a:rPr>
-              <a:t>?seqid</a:t>
+              <a:t>fcumsum</a:t>
+            </a:r>
+            <a:r>
+              <a:rPr lang="de-DE" sz="900" b="0" dirty="0" smtClean="0">
+                <a:solidFill>
+                  <a:srgbClr val="000000"/>
+                </a:solidFill>
+                <a:latin typeface="Lucida Console" panose="020B0609040504020204" pitchFamily="49" charset="0"/>
+                <a:ea typeface="+mn-ea"/>
+                <a:cs typeface="+mn-cs"/>
+                <a:sym typeface="Source Sans Pro Light"/>
+              </a:rPr>
+              <a:t>(x, g, o, na.rm, </a:t>
+            </a:r>
+            <a:r>
+              <a:rPr lang="de-DE" sz="900" b="0" dirty="0" err="1" smtClean="0">
+                <a:solidFill>
+                  <a:srgbClr val="000000"/>
+                </a:solidFill>
+                <a:latin typeface="Lucida Console" panose="020B0609040504020204" pitchFamily="49" charset="0"/>
+                <a:ea typeface="+mn-ea"/>
+                <a:cs typeface="+mn-cs"/>
+                <a:sym typeface="Source Sans Pro Light"/>
+              </a:rPr>
+              <a:t>fill</a:t>
+            </a:r>
+            <a:r>
+              <a:rPr lang="de-DE" sz="900" b="0" dirty="0" smtClean="0">
+                <a:solidFill>
+                  <a:srgbClr val="000000"/>
+                </a:solidFill>
+                <a:latin typeface="Lucida Console" panose="020B0609040504020204" pitchFamily="49" charset="0"/>
+                <a:ea typeface="+mn-ea"/>
+                <a:cs typeface="+mn-cs"/>
+                <a:sym typeface="Source Sans Pro Light"/>
+              </a:rPr>
+              <a:t>, )</a:t>
             </a:r>
             <a:endParaRPr lang="en-US" sz="900" b="0" dirty="0" smtClean="0">
               <a:solidFill>
@@ -5972,7 +5998,7 @@
           </a:ln>
           <a:extLst>
             <a:ext uri="{C572A759-6A51-4108-AA02-DFA0A04FC94B}">
-              <ma14:wrappingTextBoxFlag xmlns:ma14="http://schemas.microsoft.com/office/mac/drawingml/2011/main" xmlns:a14="http://schemas.microsoft.com/office/drawing/2010/main" xmlns:m="http://schemas.openxmlformats.org/officeDocument/2006/math" xmlns="" val="1"/>
+              <ma14:wrappingTextBoxFlag xmlns="" xmlns:m="http://schemas.openxmlformats.org/officeDocument/2006/math" xmlns:a14="http://schemas.microsoft.com/office/drawing/2010/main" xmlns:ma14="http://schemas.microsoft.com/office/mac/drawingml/2011/main" val="1"/>
             </a:ext>
           </a:extLst>
         </p:spPr>
@@ -6154,7 +6180,7 @@
             </a:ln>
             <a:extLst>
               <a:ext uri="{C572A759-6A51-4108-AA02-DFA0A04FC94B}">
-                <ma14:wrappingTextBoxFlag xmlns:ma14="http://schemas.microsoft.com/office/mac/drawingml/2011/main" xmlns:a14="http://schemas.microsoft.com/office/drawing/2010/main" xmlns:m="http://schemas.openxmlformats.org/officeDocument/2006/math" xmlns="" val="1"/>
+                <ma14:wrappingTextBoxFlag xmlns="" xmlns:m="http://schemas.openxmlformats.org/officeDocument/2006/math" xmlns:a14="http://schemas.microsoft.com/office/drawing/2010/main" xmlns:ma14="http://schemas.microsoft.com/office/mac/drawingml/2011/main" val="1"/>
               </a:ext>
             </a:extLst>
           </p:spPr>
@@ -6231,7 +6257,7 @@
               </a:r>
               <a:r>
                 <a:rPr lang="en-US" dirty="0" smtClean="0"/>
-                <a:t>•  package version  1.4.2  •  Updated: 2020-11</a:t>
+                <a:t>•  package version  1.6.1  •  Updated: 2021-07</a:t>
               </a:r>
               <a:endParaRPr lang="en-US" dirty="0"/>
             </a:p>
@@ -6298,7 +6324,7 @@
           </a:ln>
           <a:extLst>
             <a:ext uri="{C572A759-6A51-4108-AA02-DFA0A04FC94B}">
-              <ma14:wrappingTextBoxFlag xmlns:ma14="http://schemas.microsoft.com/office/mac/drawingml/2011/main" xmlns:a14="http://schemas.microsoft.com/office/drawing/2010/main" xmlns:m="http://schemas.openxmlformats.org/officeDocument/2006/math" xmlns="" val="1"/>
+              <ma14:wrappingTextBoxFlag xmlns="" xmlns:m="http://schemas.openxmlformats.org/officeDocument/2006/math" xmlns:a14="http://schemas.microsoft.com/office/drawing/2010/main" xmlns:ma14="http://schemas.microsoft.com/office/mac/drawingml/2011/main" val="1"/>
             </a:ext>
           </a:extLst>
         </p:spPr>
@@ -6476,15 +6502,23 @@
             </a:r>
             <a:r>
               <a:rPr lang="de-DE" sz="1100" i="1" dirty="0"/>
-              <a:t> data.table</a:t>
-            </a:r>
-            <a:r>
-              <a:rPr lang="de-DE" sz="1100" dirty="0"/>
               <a:t> </a:t>
             </a:r>
             <a:r>
+              <a:rPr lang="de-DE" sz="1100" i="1" dirty="0" err="1" smtClean="0"/>
+              <a:t>data.table</a:t>
+            </a:r>
+            <a:r>
+              <a:rPr lang="de-DE" sz="1100" i="1" dirty="0"/>
+              <a:t>, </a:t>
+            </a:r>
+            <a:r>
+              <a:rPr lang="de-DE" sz="1100" i="1" dirty="0" smtClean="0"/>
+              <a:t>sf</a:t>
+            </a:r>
+            <a:r>
               <a:rPr lang="de-DE" sz="1100" dirty="0" smtClean="0"/>
-              <a:t>and </a:t>
+              <a:t> and </a:t>
             </a:r>
             <a:r>
               <a:rPr lang="de-DE" sz="1100" i="1" dirty="0" smtClean="0"/>
@@ -6492,25 +6526,69 @@
             </a:r>
             <a:r>
               <a:rPr lang="de-DE" sz="1100" dirty="0" smtClean="0"/>
-              <a:t> classes for panel data, and can be programmed using pipes </a:t>
+              <a:t> classes for panel data, and can be programmed </a:t>
+            </a:r>
+            <a:r>
+              <a:rPr lang="de-DE" sz="1100" dirty="0" err="1" smtClean="0"/>
+              <a:t>using</a:t>
+            </a:r>
+            <a:r>
+              <a:rPr lang="de-DE" sz="1100" dirty="0" smtClean="0"/>
+              <a:t> </a:t>
+            </a:r>
+            <a:r>
+              <a:rPr lang="de-DE" sz="1100" dirty="0" err="1" smtClean="0"/>
+              <a:t>pipes</a:t>
+            </a:r>
+            <a:r>
+              <a:rPr lang="de-DE" sz="1100" dirty="0" smtClean="0"/>
+              <a:t> (</a:t>
             </a:r>
             <a:r>
               <a:rPr lang="de-DE" sz="900" dirty="0" smtClean="0">
                 <a:latin typeface="Lucida Console" panose="020B0609040504020204" pitchFamily="49" charset="0"/>
               </a:rPr>
-              <a:t>%&gt;%</a:t>
+              <a:t>%&gt;%,</a:t>
+            </a:r>
+            <a:r>
+              <a:rPr lang="de-DE" sz="300" dirty="0" smtClean="0">
+                <a:latin typeface="Lucida Console" panose="020B0609040504020204" pitchFamily="49" charset="0"/>
+              </a:rPr>
+              <a:t> </a:t>
+            </a:r>
+            <a:r>
+              <a:rPr lang="de-DE" sz="900" dirty="0" smtClean="0">
+                <a:latin typeface="Lucida Console" panose="020B0609040504020204" pitchFamily="49" charset="0"/>
+              </a:rPr>
+              <a:t>|&gt;</a:t>
             </a:r>
             <a:r>
               <a:rPr lang="de-DE" sz="1100" b="0" dirty="0" smtClean="0"/>
-              <a:t> (</a:t>
-            </a:r>
-            <a:r>
-              <a:rPr lang="de-DE" sz="1100" b="0" i="1" dirty="0" smtClean="0"/>
-              <a:t>magrittr</a:t>
+              <a:t>),  </a:t>
+            </a:r>
+            <a:r>
+              <a:rPr lang="de-DE" sz="1100" b="0" dirty="0" err="1" smtClean="0"/>
+              <a:t>standard</a:t>
             </a:r>
             <a:r>
               <a:rPr lang="de-DE" sz="1100" b="0" dirty="0" smtClean="0"/>
-              <a:t>) or standard evaluation. </a:t>
+              <a:t> </a:t>
+            </a:r>
+            <a:r>
+              <a:rPr lang="de-DE" sz="1100" b="0" dirty="0" err="1" smtClean="0"/>
+              <a:t>or</a:t>
+            </a:r>
+            <a:r>
+              <a:rPr lang="de-DE" sz="1100" b="0" dirty="0" smtClean="0"/>
+              <a:t> non-standard </a:t>
+            </a:r>
+            <a:r>
+              <a:rPr lang="de-DE" sz="1100" b="0" dirty="0" err="1" smtClean="0"/>
+              <a:t>evaluation</a:t>
+            </a:r>
+            <a:r>
+              <a:rPr lang="de-DE" sz="1100" b="0" dirty="0" smtClean="0"/>
+              <a:t>. </a:t>
             </a:r>
             <a:r>
               <a:rPr lang="de-DE" sz="1100" dirty="0" smtClean="0"/>
@@ -6561,7 +6639,7 @@
           </a:ln>
           <a:extLst>
             <a:ext uri="{C572A759-6A51-4108-AA02-DFA0A04FC94B}">
-              <ma14:wrappingTextBoxFlag xmlns:ma14="http://schemas.microsoft.com/office/mac/drawingml/2011/main" xmlns:a14="http://schemas.microsoft.com/office/drawing/2010/main" xmlns:m="http://schemas.openxmlformats.org/officeDocument/2006/math" xmlns="" val="1"/>
+              <ma14:wrappingTextBoxFlag xmlns="" xmlns:m="http://schemas.openxmlformats.org/officeDocument/2006/math" xmlns:a14="http://schemas.microsoft.com/office/drawing/2010/main" xmlns:ma14="http://schemas.microsoft.com/office/mac/drawingml/2011/main" val="1"/>
             </a:ext>
           </a:extLst>
         </p:spPr>
@@ -6612,7 +6690,7 @@
           </a:ln>
           <a:extLst>
             <a:ext uri="{C572A759-6A51-4108-AA02-DFA0A04FC94B}">
-              <ma14:wrappingTextBoxFlag xmlns:ma14="http://schemas.microsoft.com/office/mac/drawingml/2011/main" xmlns:a14="http://schemas.microsoft.com/office/drawing/2010/main" xmlns:m="http://schemas.openxmlformats.org/officeDocument/2006/math" xmlns="" val="1"/>
+              <ma14:wrappingTextBoxFlag xmlns="" xmlns:m="http://schemas.openxmlformats.org/officeDocument/2006/math" xmlns:a14="http://schemas.microsoft.com/office/drawing/2010/main" xmlns:ma14="http://schemas.microsoft.com/office/mac/drawingml/2011/main" val="1"/>
             </a:ext>
           </a:extLst>
         </p:spPr>
@@ -7815,7 +7893,7 @@
             <a:effectLst/>
             <a:extLst>
               <a:ext uri="{C572A759-6A51-4108-AA02-DFA0A04FC94B}">
-                <ma14:wrappingTextBoxFlag xmlns:ma14="http://schemas.microsoft.com/office/mac/drawingml/2011/main" xmlns:a14="http://schemas.microsoft.com/office/drawing/2010/main" xmlns:m="http://schemas.openxmlformats.org/officeDocument/2006/math" xmlns="" val="1"/>
+                <ma14:wrappingTextBoxFlag xmlns="" xmlns:m="http://schemas.openxmlformats.org/officeDocument/2006/math" xmlns:a14="http://schemas.microsoft.com/office/drawing/2010/main" xmlns:ma14="http://schemas.microsoft.com/office/mac/drawingml/2011/main" val="1"/>
               </a:ext>
             </a:extLst>
           </p:spPr>
@@ -7915,7 +7993,7 @@
           </a:ln>
           <a:extLst>
             <a:ext uri="{C572A759-6A51-4108-AA02-DFA0A04FC94B}">
-              <ma14:wrappingTextBoxFlag xmlns:ma14="http://schemas.microsoft.com/office/mac/drawingml/2011/main" xmlns:a14="http://schemas.microsoft.com/office/drawing/2010/main" xmlns:m="http://schemas.openxmlformats.org/officeDocument/2006/math" xmlns="" val="1"/>
+              <ma14:wrappingTextBoxFlag xmlns="" xmlns:m="http://schemas.openxmlformats.org/officeDocument/2006/math" xmlns:a14="http://schemas.microsoft.com/office/drawing/2010/main" xmlns:ma14="http://schemas.microsoft.com/office/mac/drawingml/2011/main" val="1"/>
             </a:ext>
           </a:extLst>
         </p:spPr>
@@ -8015,7 +8093,7 @@
           </a:ln>
           <a:extLst>
             <a:ext uri="{C572A759-6A51-4108-AA02-DFA0A04FC94B}">
-              <ma14:wrappingTextBoxFlag xmlns:ma14="http://schemas.microsoft.com/office/mac/drawingml/2011/main" xmlns:a14="http://schemas.microsoft.com/office/drawing/2010/main" xmlns:m="http://schemas.openxmlformats.org/officeDocument/2006/math" xmlns="" val="1"/>
+              <ma14:wrappingTextBoxFlag xmlns="" xmlns:m="http://schemas.openxmlformats.org/officeDocument/2006/math" xmlns:a14="http://schemas.microsoft.com/office/drawing/2010/main" xmlns:ma14="http://schemas.microsoft.com/office/mac/drawingml/2011/main" val="1"/>
             </a:ext>
           </a:extLst>
         </p:spPr>
@@ -8157,7 +8235,7 @@
           </a:ln>
           <a:extLst>
             <a:ext uri="{C572A759-6A51-4108-AA02-DFA0A04FC94B}">
-              <ma14:wrappingTextBoxFlag xmlns:ma14="http://schemas.microsoft.com/office/mac/drawingml/2011/main" xmlns:a14="http://schemas.microsoft.com/office/drawing/2010/main" xmlns:m="http://schemas.openxmlformats.org/officeDocument/2006/math" xmlns="" val="1"/>
+              <ma14:wrappingTextBoxFlag xmlns="" xmlns:m="http://schemas.openxmlformats.org/officeDocument/2006/math" xmlns:a14="http://schemas.microsoft.com/office/drawing/2010/main" xmlns:ma14="http://schemas.microsoft.com/office/mac/drawingml/2011/main" val="1"/>
             </a:ext>
           </a:extLst>
         </p:spPr>
@@ -8274,7 +8352,7 @@
             <a:effectLst/>
             <a:extLst>
               <a:ext uri="{C572A759-6A51-4108-AA02-DFA0A04FC94B}">
-                <ma14:wrappingTextBoxFlag xmlns:ma14="http://schemas.microsoft.com/office/mac/drawingml/2011/main" xmlns:a14="http://schemas.microsoft.com/office/drawing/2010/main" xmlns:m="http://schemas.openxmlformats.org/officeDocument/2006/math" xmlns="" val="1"/>
+                <ma14:wrappingTextBoxFlag xmlns="" xmlns:m="http://schemas.openxmlformats.org/officeDocument/2006/math" xmlns:a14="http://schemas.microsoft.com/office/drawing/2010/main" xmlns:ma14="http://schemas.microsoft.com/office/mac/drawingml/2011/main" val="1"/>
               </a:ext>
             </a:extLst>
           </p:spPr>
@@ -8374,7 +8452,7 @@
           </a:ln>
           <a:extLst>
             <a:ext uri="{C572A759-6A51-4108-AA02-DFA0A04FC94B}">
-              <ma14:wrappingTextBoxFlag xmlns:ma14="http://schemas.microsoft.com/office/mac/drawingml/2011/main" xmlns:a14="http://schemas.microsoft.com/office/drawing/2010/main" xmlns:m="http://schemas.openxmlformats.org/officeDocument/2006/math" xmlns="" val="1"/>
+              <ma14:wrappingTextBoxFlag xmlns="" xmlns:m="http://schemas.openxmlformats.org/officeDocument/2006/math" xmlns:a14="http://schemas.microsoft.com/office/drawing/2010/main" xmlns:ma14="http://schemas.microsoft.com/office/mac/drawingml/2011/main" val="1"/>
             </a:ext>
           </a:extLst>
         </p:spPr>
@@ -8474,7 +8552,7 @@
           </a:ln>
           <a:extLst>
             <a:ext uri="{C572A759-6A51-4108-AA02-DFA0A04FC94B}">
-              <ma14:wrappingTextBoxFlag xmlns:ma14="http://schemas.microsoft.com/office/mac/drawingml/2011/main" xmlns:a14="http://schemas.microsoft.com/office/drawing/2010/main" xmlns:m="http://schemas.openxmlformats.org/officeDocument/2006/math" xmlns="" val="1"/>
+              <ma14:wrappingTextBoxFlag xmlns="" xmlns:m="http://schemas.openxmlformats.org/officeDocument/2006/math" xmlns:a14="http://schemas.microsoft.com/office/drawing/2010/main" xmlns:ma14="http://schemas.microsoft.com/office/mac/drawingml/2011/main" val="1"/>
             </a:ext>
           </a:extLst>
         </p:spPr>
@@ -8554,7 +8632,7 @@
             <a:effectLst/>
             <a:extLst>
               <a:ext uri="{C572A759-6A51-4108-AA02-DFA0A04FC94B}">
-                <ma14:wrappingTextBoxFlag xmlns:ma14="http://schemas.microsoft.com/office/mac/drawingml/2011/main" xmlns:a14="http://schemas.microsoft.com/office/drawing/2010/main" xmlns:m="http://schemas.openxmlformats.org/officeDocument/2006/math" xmlns="" val="1"/>
+                <ma14:wrappingTextBoxFlag xmlns="" xmlns:m="http://schemas.openxmlformats.org/officeDocument/2006/math" xmlns:a14="http://schemas.microsoft.com/office/drawing/2010/main" xmlns:ma14="http://schemas.microsoft.com/office/mac/drawingml/2011/main" val="1"/>
               </a:ext>
             </a:extLst>
           </p:spPr>
@@ -8654,7 +8732,7 @@
           </a:ln>
           <a:extLst>
             <a:ext uri="{C572A759-6A51-4108-AA02-DFA0A04FC94B}">
-              <ma14:wrappingTextBoxFlag xmlns:ma14="http://schemas.microsoft.com/office/mac/drawingml/2011/main" xmlns:a14="http://schemas.microsoft.com/office/drawing/2010/main" xmlns:m="http://schemas.openxmlformats.org/officeDocument/2006/math" xmlns="" val="1"/>
+              <ma14:wrappingTextBoxFlag xmlns="" xmlns:m="http://schemas.openxmlformats.org/officeDocument/2006/math" xmlns:a14="http://schemas.microsoft.com/office/drawing/2010/main" xmlns:ma14="http://schemas.microsoft.com/office/mac/drawingml/2011/main" val="1"/>
             </a:ext>
           </a:extLst>
         </p:spPr>
@@ -8754,7 +8832,7 @@
           </a:ln>
           <a:extLst>
             <a:ext uri="{C572A759-6A51-4108-AA02-DFA0A04FC94B}">
-              <ma14:wrappingTextBoxFlag xmlns:ma14="http://schemas.microsoft.com/office/mac/drawingml/2011/main" xmlns:a14="http://schemas.microsoft.com/office/drawing/2010/main" xmlns:m="http://schemas.openxmlformats.org/officeDocument/2006/math" xmlns="" val="1"/>
+              <ma14:wrappingTextBoxFlag xmlns="" xmlns:m="http://schemas.openxmlformats.org/officeDocument/2006/math" xmlns:a14="http://schemas.microsoft.com/office/drawing/2010/main" xmlns:ma14="http://schemas.microsoft.com/office/mac/drawingml/2011/main" val="1"/>
             </a:ext>
           </a:extLst>
         </p:spPr>
@@ -9009,7 +9087,7 @@
           </a:ln>
           <a:extLst>
             <a:ext uri="{C572A759-6A51-4108-AA02-DFA0A04FC94B}">
-              <ma14:wrappingTextBoxFlag xmlns:ma14="http://schemas.microsoft.com/office/mac/drawingml/2011/main" xmlns:a14="http://schemas.microsoft.com/office/drawing/2010/main" xmlns:m="http://schemas.openxmlformats.org/officeDocument/2006/math" xmlns="" val="1"/>
+              <ma14:wrappingTextBoxFlag xmlns="" xmlns:m="http://schemas.openxmlformats.org/officeDocument/2006/math" xmlns:a14="http://schemas.microsoft.com/office/drawing/2010/main" xmlns:ma14="http://schemas.microsoft.com/office/mac/drawingml/2011/main" val="1"/>
             </a:ext>
           </a:extLst>
         </p:spPr>
@@ -9685,7 +9763,7 @@
               <a:effectLst/>
               <a:extLst>
                 <a:ext uri="{C572A759-6A51-4108-AA02-DFA0A04FC94B}">
-                  <ma14:wrappingTextBoxFlag xmlns:ma14="http://schemas.microsoft.com/office/mac/drawingml/2011/main" xmlns:a14="http://schemas.microsoft.com/office/drawing/2010/main" xmlns:m="http://schemas.openxmlformats.org/officeDocument/2006/math" xmlns="" val="1"/>
+                  <ma14:wrappingTextBoxFlag xmlns="" xmlns:m="http://schemas.openxmlformats.org/officeDocument/2006/math" xmlns:a14="http://schemas.microsoft.com/office/drawing/2010/main" xmlns:ma14="http://schemas.microsoft.com/office/mac/drawingml/2011/main" val="1"/>
                 </a:ext>
               </a:extLst>
             </p:spPr>
@@ -9845,7 +9923,7 @@
           <a:effectLst/>
           <a:extLst>
             <a:ext uri="{C572A759-6A51-4108-AA02-DFA0A04FC94B}">
-              <ma14:wrappingTextBoxFlag xmlns:ma14="http://schemas.microsoft.com/office/mac/drawingml/2011/main" xmlns:a14="http://schemas.microsoft.com/office/drawing/2010/main" xmlns:m="http://schemas.openxmlformats.org/officeDocument/2006/math" xmlns="" val="1"/>
+              <ma14:wrappingTextBoxFlag xmlns="" xmlns:m="http://schemas.openxmlformats.org/officeDocument/2006/math" xmlns:a14="http://schemas.microsoft.com/office/drawing/2010/main" xmlns:ma14="http://schemas.microsoft.com/office/mac/drawingml/2011/main" val="1"/>
             </a:ext>
           </a:extLst>
         </p:spPr>
@@ -9869,7 +9947,25 @@
               <a:rPr lang="en-US" sz="900" b="0" dirty="0" smtClean="0">
                 <a:latin typeface="Lucida Console" panose="020B0609040504020204" pitchFamily="49" charset="0"/>
               </a:rPr>
-              <a:t>fmean, fmedian, fmode, fsum, fprod, fsd, fvar, fmin, fmax, fnth, ffirst, flast, fNobs, fNdistinct</a:t>
+              <a:t>fmean, fmedian, fmode, fsum, fprod, fsd, fvar, fmin, fmax, fnth, ffirst, flast, </a:t>
+            </a:r>
+            <a:r>
+              <a:rPr lang="en-US" sz="900" b="0" dirty="0" err="1" smtClean="0">
+                <a:latin typeface="Lucida Console" panose="020B0609040504020204" pitchFamily="49" charset="0"/>
+              </a:rPr>
+              <a:t>fnobs</a:t>
+            </a:r>
+            <a:r>
+              <a:rPr lang="en-US" sz="900" b="0" dirty="0" smtClean="0">
+                <a:latin typeface="Lucida Console" panose="020B0609040504020204" pitchFamily="49" charset="0"/>
+              </a:rPr>
+              <a:t>, </a:t>
+            </a:r>
+            <a:r>
+              <a:rPr lang="en-US" sz="900" b="0" dirty="0" err="1" smtClean="0">
+                <a:latin typeface="Lucida Console" panose="020B0609040504020204" pitchFamily="49" charset="0"/>
+              </a:rPr>
+              <a:t>fndistinct</a:t>
             </a:r>
             <a:endParaRPr lang="en-US" sz="200" dirty="0" smtClean="0"/>
           </a:p>
@@ -10865,16 +10961,7 @@
                 </a:solidFill>
                 <a:latin typeface="Lucida Console" panose="020B0609040504020204" pitchFamily="49" charset="0"/>
               </a:rPr>
-              <a:t>replace_fill</a:t>
-            </a:r>
-            <a:r>
-              <a:rPr lang="en-US" sz="900" b="0" dirty="0">
-                <a:solidFill>
-                  <a:srgbClr val="000000"/>
-                </a:solidFill>
-                <a:latin typeface="Lucida Console" panose="020B0609040504020204" pitchFamily="49" charset="0"/>
-              </a:rPr>
-              <a:t>‘</a:t>
+              <a:t>replace_fill‘</a:t>
             </a:r>
             <a:r>
               <a:rPr lang="en-US" sz="900" b="0" dirty="0">
@@ -10934,19 +11021,8 @@
                 <a:latin typeface="+mn-lt"/>
                 <a:ea typeface="Source Sans Pro Light" panose="020B0403030403020204" pitchFamily="34" charset="0"/>
               </a:rPr>
-              <a:t>– same but keep missing values in </a:t>
-            </a:r>
-            <a:r>
-              <a:rPr lang="en-US" sz="900" b="0" dirty="0" smtClean="0">
-                <a:latin typeface="+mn-lt"/>
-                <a:ea typeface="Source Sans Pro Light" panose="020B0403030403020204" pitchFamily="34" charset="0"/>
-              </a:rPr>
-              <a:t>data,</a:t>
-            </a:r>
-            <a:endParaRPr lang="en-US" sz="900" b="0" dirty="0" smtClean="0">
-              <a:latin typeface="+mn-lt"/>
-              <a:ea typeface="Source Sans Pro Light" panose="020B0403030403020204" pitchFamily="34" charset="0"/>
-            </a:endParaRPr>
+              <a:t>– same but keep missing values in data,</a:t>
+            </a:r>
           </a:p>
           <a:p>
             <a:pPr>
@@ -11018,19 +11094,8 @@
                 <a:latin typeface="+mn-lt"/>
                 <a:ea typeface="Source Sans Pro Light" panose="020B0403030403020204" pitchFamily="34" charset="0"/>
               </a:rPr>
-              <a:t> – center on overall average </a:t>
-            </a:r>
-            <a:r>
-              <a:rPr lang="en-US" sz="900" b="0" dirty="0" smtClean="0">
-                <a:latin typeface="+mn-lt"/>
-                <a:ea typeface="Source Sans Pro Light" panose="020B0403030403020204" pitchFamily="34" charset="0"/>
-              </a:rPr>
-              <a:t>statistic,</a:t>
-            </a:r>
-            <a:endParaRPr lang="en-US" sz="900" b="0" dirty="0" smtClean="0">
-              <a:latin typeface="+mn-lt"/>
-              <a:ea typeface="Source Sans Pro Light" panose="020B0403030403020204" pitchFamily="34" charset="0"/>
-            </a:endParaRPr>
+              <a:t> – center on overall average statistic,</a:t>
+            </a:r>
           </a:p>
           <a:p>
             <a:pPr>
@@ -11109,14 +11174,7 @@
                 <a:latin typeface="+mn-lt"/>
                 <a:ea typeface="Source Sans Pro Light" panose="020B0403030403020204" pitchFamily="34" charset="0"/>
               </a:rPr>
-              <a:t> </a:t>
-            </a:r>
-            <a:r>
-              <a:rPr lang="en-US" sz="900" b="0" dirty="0" smtClean="0">
-                <a:latin typeface="+mn-lt"/>
-                <a:ea typeface="Source Sans Pro Light" panose="020B0403030403020204" pitchFamily="34" charset="0"/>
-              </a:rPr>
-              <a:t>– add,</a:t>
+              <a:t> – add,</a:t>
             </a:r>
             <a:r>
               <a:rPr lang="en-US" sz="900" dirty="0" smtClean="0">
@@ -11126,11 +11184,6 @@
               </a:rPr>
               <a:t> </a:t>
             </a:r>
-            <a:endParaRPr lang="en-US" sz="900" dirty="0" smtClean="0">
-              <a:solidFill>
-                <a:srgbClr val="000000"/>
-              </a:solidFill>
-            </a:endParaRPr>
           </a:p>
           <a:p>
             <a:pPr>
@@ -11159,16 +11212,7 @@
                 </a:solidFill>
                 <a:latin typeface="Lucida Console" panose="020B0609040504020204" pitchFamily="49" charset="0"/>
               </a:rPr>
-              <a:t>    </a:t>
-            </a:r>
-            <a:r>
-              <a:rPr lang="en-US" sz="900" b="0" dirty="0" smtClean="0">
-                <a:solidFill>
-                  <a:srgbClr val="000000"/>
-                </a:solidFill>
-                <a:latin typeface="Lucida Console" panose="020B0609040504020204" pitchFamily="49" charset="0"/>
-              </a:rPr>
-              <a:t>‘*‘</a:t>
+              <a:t>    ‘*‘</a:t>
             </a:r>
             <a:r>
               <a:rPr lang="en-US" sz="900" b="0" dirty="0">
@@ -11211,50 +11255,32 @@
                 <a:latin typeface="+mn-lt"/>
                 <a:ea typeface="Source Sans Pro Light" panose="020B0403030403020204" pitchFamily="34" charset="0"/>
               </a:rPr>
-              <a:t>odulus</a:t>
+              <a:t>odulus, </a:t>
+            </a:r>
+            <a:r>
+              <a:rPr lang="en-US" sz="900" b="0" dirty="0" smtClean="0">
+                <a:solidFill>
+                  <a:srgbClr val="000000"/>
+                </a:solidFill>
+                <a:latin typeface="Lucida Console" panose="020B0609040504020204" pitchFamily="49" charset="0"/>
+              </a:rPr>
+              <a:t>‘-%%‘</a:t>
+            </a:r>
+            <a:r>
+              <a:rPr lang="en-US" sz="900" dirty="0" smtClean="0">
+                <a:solidFill>
+                  <a:srgbClr val="000000"/>
+                </a:solidFill>
+              </a:rPr>
+              <a:t> </a:t>
             </a:r>
             <a:r>
               <a:rPr lang="en-US" sz="900" b="0" dirty="0" smtClean="0">
                 <a:latin typeface="+mn-lt"/>
                 <a:ea typeface="Source Sans Pro Light" panose="020B0403030403020204" pitchFamily="34" charset="0"/>
               </a:rPr>
-              <a:t>, </a:t>
-            </a:r>
-            <a:r>
-              <a:rPr lang="en-US" sz="900" b="0" dirty="0" smtClean="0">
-                <a:solidFill>
-                  <a:srgbClr val="000000"/>
-                </a:solidFill>
-                <a:latin typeface="Lucida Console" panose="020B0609040504020204" pitchFamily="49" charset="0"/>
-              </a:rPr>
-              <a:t>‘-%%‘</a:t>
-            </a:r>
-            <a:r>
-              <a:rPr lang="en-US" sz="900" dirty="0" smtClean="0">
-                <a:solidFill>
-                  <a:srgbClr val="000000"/>
-                </a:solidFill>
-              </a:rPr>
-              <a:t> </a:t>
-            </a:r>
-            <a:r>
-              <a:rPr lang="en-US" sz="900" b="0" dirty="0" smtClean="0">
-                <a:latin typeface="+mn-lt"/>
-                <a:ea typeface="Source Sans Pro Light" panose="020B0403030403020204" pitchFamily="34" charset="0"/>
-              </a:rPr>
-              <a:t>– </a:t>
-            </a:r>
-            <a:r>
-              <a:rPr lang="en-US" sz="900" b="0" dirty="0" smtClean="0">
-                <a:latin typeface="+mn-lt"/>
-                <a:ea typeface="Source Sans Pro Light" panose="020B0403030403020204" pitchFamily="34" charset="0"/>
-              </a:rPr>
-              <a:t>flatten</a:t>
-            </a:r>
-            <a:endParaRPr lang="en-US" sz="900" b="0" dirty="0" smtClean="0">
-              <a:latin typeface="+mn-lt"/>
-              <a:ea typeface="Source Sans Pro Light" panose="020B0403030403020204" pitchFamily="34" charset="0"/>
-            </a:endParaRPr>
+              <a:t>– flatten</a:t>
+            </a:r>
           </a:p>
           <a:p>
             <a:pPr>
@@ -11513,7 +11539,7 @@
           </a:ln>
           <a:extLst>
             <a:ext uri="{C572A759-6A51-4108-AA02-DFA0A04FC94B}">
-              <ma14:wrappingTextBoxFlag xmlns:ma14="http://schemas.microsoft.com/office/mac/drawingml/2011/main" xmlns:a14="http://schemas.microsoft.com/office/drawing/2010/main" xmlns:m="http://schemas.openxmlformats.org/officeDocument/2006/math" xmlns="" val="1"/>
+              <ma14:wrappingTextBoxFlag xmlns="" xmlns:m="http://schemas.openxmlformats.org/officeDocument/2006/math" xmlns:a14="http://schemas.microsoft.com/office/drawing/2010/main" xmlns:ma14="http://schemas.microsoft.com/office/mac/drawingml/2011/main" val="1"/>
             </a:ext>
           </a:extLst>
         </p:spPr>
@@ -11636,7 +11662,7 @@
           </a:ln>
           <a:extLst>
             <a:ext uri="{C572A759-6A51-4108-AA02-DFA0A04FC94B}">
-              <ma14:wrappingTextBoxFlag xmlns:ma14="http://schemas.microsoft.com/office/mac/drawingml/2011/main" xmlns:a14="http://schemas.microsoft.com/office/drawing/2010/main" xmlns:m="http://schemas.openxmlformats.org/officeDocument/2006/math" xmlns="" val="1"/>
+              <ma14:wrappingTextBoxFlag xmlns="" xmlns:m="http://schemas.openxmlformats.org/officeDocument/2006/math" xmlns:a14="http://schemas.microsoft.com/office/drawing/2010/main" xmlns:ma14="http://schemas.microsoft.com/office/mac/drawingml/2011/main" val="1"/>
             </a:ext>
           </a:extLst>
         </p:spPr>
@@ -11739,7 +11765,7 @@
           <a:effectLst/>
           <a:extLst>
             <a:ext uri="{C572A759-6A51-4108-AA02-DFA0A04FC94B}">
-              <ma14:wrappingTextBoxFlag xmlns:ma14="http://schemas.microsoft.com/office/mac/drawingml/2011/main" xmlns:a14="http://schemas.microsoft.com/office/drawing/2010/main" xmlns:m="http://schemas.openxmlformats.org/officeDocument/2006/math" xmlns="" val="1"/>
+              <ma14:wrappingTextBoxFlag xmlns="" xmlns:m="http://schemas.openxmlformats.org/officeDocument/2006/math" xmlns:a14="http://schemas.microsoft.com/office/drawing/2010/main" xmlns:ma14="http://schemas.microsoft.com/office/mac/drawingml/2011/main" val="1"/>
             </a:ext>
           </a:extLst>
         </p:spPr>
@@ -12785,9 +12811,9 @@
         <p:grpSpPr>
           <a:xfrm>
             <a:off x="7124372" y="5037051"/>
-            <a:ext cx="3168389" cy="3976299"/>
+            <a:ext cx="3168389" cy="3914744"/>
             <a:chOff x="7124372" y="4843933"/>
-            <a:chExt cx="3168389" cy="3976299"/>
+            <a:chExt cx="3168389" cy="3914744"/>
           </a:xfrm>
         </p:grpSpPr>
         <p:sp>
@@ -12809,7 +12835,7 @@
             </a:ln>
             <a:extLst>
               <a:ext uri="{C572A759-6A51-4108-AA02-DFA0A04FC94B}">
-                <ma14:wrappingTextBoxFlag xmlns:ma14="http://schemas.microsoft.com/office/mac/drawingml/2011/main" xmlns:a14="http://schemas.microsoft.com/office/drawing/2010/main" xmlns:m="http://schemas.openxmlformats.org/officeDocument/2006/math" xmlns="" val="1"/>
+                <ma14:wrappingTextBoxFlag xmlns="" xmlns:m="http://schemas.openxmlformats.org/officeDocument/2006/math" xmlns:a14="http://schemas.microsoft.com/office/drawing/2010/main" xmlns:ma14="http://schemas.microsoft.com/office/mac/drawingml/2011/main" val="1"/>
               </a:ext>
             </a:extLst>
           </p:spPr>
@@ -12899,7 +12925,7 @@
           <p:spPr>
             <a:xfrm>
               <a:off x="7124372" y="5273107"/>
-              <a:ext cx="3168389" cy="3547125"/>
+              <a:ext cx="3168389" cy="3485570"/>
             </a:xfrm>
             <a:prstGeom prst="rect">
               <a:avLst/>
@@ -12909,7 +12935,7 @@
             </a:ln>
             <a:extLst>
               <a:ext uri="{C572A759-6A51-4108-AA02-DFA0A04FC94B}">
-                <ma14:wrappingTextBoxFlag xmlns:ma14="http://schemas.microsoft.com/office/mac/drawingml/2011/main" xmlns:a14="http://schemas.microsoft.com/office/drawing/2010/main" xmlns:m="http://schemas.openxmlformats.org/officeDocument/2006/math" xmlns="" val="1"/>
+                <ma14:wrappingTextBoxFlag xmlns="" xmlns:m="http://schemas.openxmlformats.org/officeDocument/2006/math" xmlns:a14="http://schemas.microsoft.com/office/drawing/2010/main" xmlns:ma14="http://schemas.microsoft.com/office/mac/drawingml/2011/main" val="1"/>
               </a:ext>
             </a:extLst>
           </p:spPr>
@@ -13466,25 +13492,10 @@
                   <a:cs typeface="+mn-cs"/>
                   <a:sym typeface="Source Sans Pro Light"/>
                 </a:rPr>
-                <a:t>– fast run-length-type group id (class ‘qG‘)</a:t>
-              </a:r>
-            </a:p>
-            <a:p>
-              <a:pPr>
-                <a:spcBef>
-                  <a:spcPts val="0"/>
-                </a:spcBef>
-                <a:spcAft>
-                  <a:spcPts val="300"/>
-                </a:spcAft>
-                <a:buClr>
-                  <a:schemeClr val="accent4">
-                    <a:hueOff val="384618"/>
-                    <a:satOff val="3869"/>
-                    <a:lumOff val="5802"/>
-                  </a:schemeClr>
-                </a:buClr>
-                <a:defRPr b="0">
+                <a:t>– fast run-length-type group id (class ‘</a:t>
+              </a:r>
+              <a:r>
+                <a:rPr lang="en-US" sz="1000" b="0" dirty="0" err="1" smtClean="0">
                   <a:solidFill>
                     <a:srgbClr val="000000"/>
                   </a:solidFill>
@@ -13492,8 +13503,21 @@
                   <a:ea typeface="+mn-ea"/>
                   <a:cs typeface="+mn-cs"/>
                   <a:sym typeface="Source Sans Pro Light"/>
-                </a:defRPr>
-              </a:pPr>
+                </a:rPr>
+                <a:t>qG</a:t>
+              </a:r>
+              <a:r>
+                <a:rPr lang="en-US" sz="1000" b="0" dirty="0" smtClean="0">
+                  <a:solidFill>
+                    <a:srgbClr val="000000"/>
+                  </a:solidFill>
+                  <a:latin typeface="+mn-lt"/>
+                  <a:ea typeface="+mn-ea"/>
+                  <a:cs typeface="+mn-cs"/>
+                  <a:sym typeface="Source Sans Pro Light"/>
+                </a:rPr>
+                <a:t>‘)</a:t>
+              </a:r>
               <a:endParaRPr lang="en-US" sz="100" b="0" dirty="0" smtClean="0">
                 <a:solidFill>
                   <a:srgbClr val="000000"/>
@@ -13557,9 +13581,53 @@
                   </a:solidFill>
                   <a:sym typeface="Source Sans Pro Light"/>
                 </a:rPr>
-                <a:t>(class ‘qG‘)</a:t>
-              </a:r>
-              <a:endParaRPr lang="en-US" sz="1000" b="0" dirty="0" smtClean="0">
+                <a:t>(class ‘</a:t>
+              </a:r>
+              <a:r>
+                <a:rPr lang="en-US" sz="1000" b="0" dirty="0" err="1" smtClean="0">
+                  <a:solidFill>
+                    <a:srgbClr val="000000"/>
+                  </a:solidFill>
+                  <a:sym typeface="Source Sans Pro Light"/>
+                </a:rPr>
+                <a:t>qG</a:t>
+              </a:r>
+              <a:r>
+                <a:rPr lang="en-US" sz="1000" b="0" dirty="0" smtClean="0">
+                  <a:solidFill>
+                    <a:srgbClr val="000000"/>
+                  </a:solidFill>
+                  <a:sym typeface="Source Sans Pro Light"/>
+                </a:rPr>
+                <a:t>‘)</a:t>
+              </a:r>
+            </a:p>
+            <a:p>
+              <a:pPr>
+                <a:spcBef>
+                  <a:spcPts val="0"/>
+                </a:spcBef>
+                <a:spcAft>
+                  <a:spcPts val="300"/>
+                </a:spcAft>
+                <a:buClr>
+                  <a:schemeClr val="accent4">
+                    <a:hueOff val="384618"/>
+                    <a:satOff val="3869"/>
+                    <a:lumOff val="5802"/>
+                  </a:schemeClr>
+                </a:buClr>
+                <a:defRPr b="0">
+                  <a:solidFill>
+                    <a:srgbClr val="000000"/>
+                  </a:solidFill>
+                  <a:latin typeface="+mn-lt"/>
+                  <a:ea typeface="+mn-ea"/>
+                  <a:cs typeface="+mn-cs"/>
+                  <a:sym typeface="Source Sans Pro Light"/>
+                </a:defRPr>
+              </a:pPr>
+              <a:endParaRPr lang="en-US" sz="100" b="0" dirty="0" smtClean="0">
                 <a:solidFill>
                   <a:srgbClr val="000000"/>
                 </a:solidFill>
@@ -13595,7 +13663,7 @@
                 </a:defRPr>
               </a:pPr>
               <a:r>
-                <a:rPr lang="en-US" sz="900" b="0" dirty="0" smtClean="0">
+                <a:rPr lang="en-US" sz="900" b="0" dirty="0" err="1" smtClean="0">
                   <a:solidFill>
                     <a:srgbClr val="000000"/>
                   </a:solidFill>
@@ -13604,7 +13672,19 @@
                   <a:cs typeface="Helvetica" panose="020B0604020202020204" pitchFamily="34" charset="0"/>
                   <a:sym typeface="Source Sans Pro Light"/>
                 </a:rPr>
-                <a:t>radixorder() </a:t>
+                <a:t>radixorder</a:t>
+              </a:r>
+              <a:r>
+                <a:rPr lang="en-US" sz="900" b="0" dirty="0" smtClean="0">
+                  <a:solidFill>
+                    <a:srgbClr val="000000"/>
+                  </a:solidFill>
+                  <a:latin typeface="Lucida Console" panose="020B0609040504020204" pitchFamily="49" charset="0"/>
+                  <a:ea typeface="+mn-ea"/>
+                  <a:cs typeface="Helvetica" panose="020B0604020202020204" pitchFamily="34" charset="0"/>
+                  <a:sym typeface="Source Sans Pro Light"/>
+                </a:rPr>
+                <a:t>[v]() </a:t>
               </a:r>
               <a:r>
                 <a:rPr lang="en-US" sz="1000" b="0" dirty="0" smtClean="0">
@@ -13944,7 +14024,7 @@
             </a:ln>
             <a:extLst>
               <a:ext uri="{C572A759-6A51-4108-AA02-DFA0A04FC94B}">
-                <ma14:wrappingTextBoxFlag xmlns:ma14="http://schemas.microsoft.com/office/mac/drawingml/2011/main" xmlns:a14="http://schemas.microsoft.com/office/drawing/2010/main" xmlns:m="http://schemas.openxmlformats.org/officeDocument/2006/math" xmlns="" val="1"/>
+                <ma14:wrappingTextBoxFlag xmlns="" xmlns:m="http://schemas.openxmlformats.org/officeDocument/2006/math" xmlns:a14="http://schemas.microsoft.com/office/drawing/2010/main" xmlns:ma14="http://schemas.microsoft.com/office/mac/drawingml/2011/main" val="1"/>
               </a:ext>
             </a:extLst>
           </p:spPr>
@@ -14044,7 +14124,7 @@
             </a:ln>
             <a:extLst>
               <a:ext uri="{C572A759-6A51-4108-AA02-DFA0A04FC94B}">
-                <ma14:wrappingTextBoxFlag xmlns:ma14="http://schemas.microsoft.com/office/mac/drawingml/2011/main" xmlns:a14="http://schemas.microsoft.com/office/drawing/2010/main" xmlns:m="http://schemas.openxmlformats.org/officeDocument/2006/math" xmlns="" val="1"/>
+                <ma14:wrappingTextBoxFlag xmlns="" xmlns:m="http://schemas.openxmlformats.org/officeDocument/2006/math" xmlns:a14="http://schemas.microsoft.com/office/drawing/2010/main" xmlns:ma14="http://schemas.microsoft.com/office/mac/drawingml/2011/main" val="1"/>
               </a:ext>
             </a:extLst>
           </p:spPr>
@@ -14276,7 +14356,7 @@
                 </a:defRPr>
               </a:pPr>
               <a:r>
-                <a:rPr lang="en-US" sz="900" b="0" dirty="0" smtClean="0">
+                <a:rPr lang="en-US" sz="900" b="0" dirty="0" err="1">
                   <a:solidFill>
                     <a:srgbClr val="000000"/>
                   </a:solidFill>
@@ -14285,7 +14365,55 @@
                   <a:cs typeface="Helvetica" panose="020B0604020202020204" pitchFamily="34" charset="0"/>
                   <a:sym typeface="Source Sans Pro Light"/>
                 </a:rPr>
-                <a:t>as.numeric_factor(), as.character_factor()</a:t>
+                <a:t>a</a:t>
+              </a:r>
+              <a:r>
+                <a:rPr lang="en-US" sz="900" b="0" dirty="0" err="1" smtClean="0">
+                  <a:solidFill>
+                    <a:srgbClr val="000000"/>
+                  </a:solidFill>
+                  <a:latin typeface="Lucida Console" panose="020B0609040504020204" pitchFamily="49" charset="0"/>
+                  <a:ea typeface="+mn-ea"/>
+                  <a:cs typeface="Helvetica" panose="020B0604020202020204" pitchFamily="34" charset="0"/>
+                  <a:sym typeface="Source Sans Pro Light"/>
+                </a:rPr>
+                <a:t>s_numeric_factor</a:t>
+              </a:r>
+              <a:r>
+                <a:rPr lang="en-US" sz="900" b="0" dirty="0" smtClean="0">
+                  <a:solidFill>
+                    <a:srgbClr val="000000"/>
+                  </a:solidFill>
+                  <a:latin typeface="Lucida Console" panose="020B0609040504020204" pitchFamily="49" charset="0"/>
+                  <a:ea typeface="+mn-ea"/>
+                  <a:cs typeface="Helvetica" panose="020B0604020202020204" pitchFamily="34" charset="0"/>
+                  <a:sym typeface="Source Sans Pro Light"/>
+                </a:rPr>
+                <a:t>(), </a:t>
+              </a:r>
+              <a:r>
+                <a:rPr lang="en-US" sz="900" b="0" dirty="0" err="1" smtClean="0">
+                  <a:solidFill>
+                    <a:srgbClr val="000000"/>
+                  </a:solidFill>
+                  <a:latin typeface="Lucida Console" panose="020B0609040504020204" pitchFamily="49" charset="0"/>
+                  <a:ea typeface="+mn-ea"/>
+                  <a:cs typeface="Helvetica" panose="020B0604020202020204" pitchFamily="34" charset="0"/>
+                  <a:sym typeface="Source Sans Pro Light"/>
+                </a:rPr>
+                <a:t>as_character_factor</a:t>
+              </a:r>
+              <a:r>
+                <a:rPr lang="en-US" sz="900" b="0" dirty="0" smtClean="0">
+                  <a:solidFill>
+                    <a:srgbClr val="000000"/>
+                  </a:solidFill>
+                  <a:latin typeface="Lucida Console" panose="020B0609040504020204" pitchFamily="49" charset="0"/>
+                  <a:ea typeface="+mn-ea"/>
+                  <a:cs typeface="Helvetica" panose="020B0604020202020204" pitchFamily="34" charset="0"/>
+                  <a:sym typeface="Source Sans Pro Light"/>
+                </a:rPr>
+                <a:t>()</a:t>
               </a:r>
             </a:p>
             <a:p>
@@ -14371,7 +14499,7 @@
             </a:ln>
             <a:extLst>
               <a:ext uri="{C572A759-6A51-4108-AA02-DFA0A04FC94B}">
-                <ma14:wrappingTextBoxFlag xmlns:ma14="http://schemas.microsoft.com/office/mac/drawingml/2011/main" xmlns:a14="http://schemas.microsoft.com/office/drawing/2010/main" xmlns:m="http://schemas.openxmlformats.org/officeDocument/2006/math" xmlns="" val="1"/>
+                <ma14:wrappingTextBoxFlag xmlns="" xmlns:m="http://schemas.openxmlformats.org/officeDocument/2006/math" xmlns:a14="http://schemas.microsoft.com/office/drawing/2010/main" xmlns:ma14="http://schemas.microsoft.com/office/mac/drawingml/2011/main" val="1"/>
               </a:ext>
             </a:extLst>
           </p:spPr>
@@ -14471,7 +14599,7 @@
             </a:ln>
             <a:extLst>
               <a:ext uri="{C572A759-6A51-4108-AA02-DFA0A04FC94B}">
-                <ma14:wrappingTextBoxFlag xmlns:ma14="http://schemas.microsoft.com/office/mac/drawingml/2011/main" xmlns:a14="http://schemas.microsoft.com/office/drawing/2010/main" xmlns:m="http://schemas.openxmlformats.org/officeDocument/2006/math" xmlns="" val="1"/>
+                <ma14:wrappingTextBoxFlag xmlns="" xmlns:m="http://schemas.openxmlformats.org/officeDocument/2006/math" xmlns:a14="http://schemas.microsoft.com/office/drawing/2010/main" xmlns:ma14="http://schemas.microsoft.com/office/mac/drawingml/2011/main" val="1"/>
               </a:ext>
             </a:extLst>
           </p:spPr>
@@ -14633,7 +14761,7 @@
                 </a:defRPr>
               </a:pPr>
               <a:r>
-                <a:rPr lang="en-US" sz="900" b="0" dirty="0" smtClean="0">
+                <a:rPr lang="en-US" sz="900" b="0" dirty="0" err="1" smtClean="0">
                   <a:solidFill>
                     <a:srgbClr val="000000"/>
                   </a:solidFill>
@@ -14641,7 +14769,7 @@
                   <a:cs typeface="Helvetica" panose="020B0604020202020204" pitchFamily="34" charset="0"/>
                   <a:sym typeface="Source Sans Pro Light"/>
                 </a:rPr>
-                <a:t>is.unlistable</a:t>
+                <a:t>is_unlistable</a:t>
               </a:r>
               <a:r>
                 <a:rPr lang="en-US" sz="900" b="0" dirty="0" smtClean="0">
@@ -15141,7 +15269,7 @@
             </a:ln>
             <a:extLst>
               <a:ext uri="{C572A759-6A51-4108-AA02-DFA0A04FC94B}">
-                <ma14:wrappingTextBoxFlag xmlns:ma14="http://schemas.microsoft.com/office/mac/drawingml/2011/main" xmlns:a14="http://schemas.microsoft.com/office/drawing/2010/main" xmlns:m="http://schemas.openxmlformats.org/officeDocument/2006/math" xmlns="" val="1"/>
+                <ma14:wrappingTextBoxFlag xmlns="" xmlns:m="http://schemas.openxmlformats.org/officeDocument/2006/math" xmlns:a14="http://schemas.microsoft.com/office/drawing/2010/main" xmlns:ma14="http://schemas.microsoft.com/office/mac/drawingml/2011/main" val="1"/>
               </a:ext>
             </a:extLst>
           </p:spPr>
@@ -15241,7 +15369,7 @@
             </a:ln>
             <a:extLst>
               <a:ext uri="{C572A759-6A51-4108-AA02-DFA0A04FC94B}">
-                <ma14:wrappingTextBoxFlag xmlns:ma14="http://schemas.microsoft.com/office/mac/drawingml/2011/main" xmlns:a14="http://schemas.microsoft.com/office/drawing/2010/main" xmlns:m="http://schemas.openxmlformats.org/officeDocument/2006/math" xmlns="" val="1"/>
+                <ma14:wrappingTextBoxFlag xmlns="" xmlns:m="http://schemas.openxmlformats.org/officeDocument/2006/math" xmlns:a14="http://schemas.microsoft.com/office/drawing/2010/main" xmlns:ma14="http://schemas.microsoft.com/office/mac/drawingml/2011/main" val="1"/>
               </a:ext>
             </a:extLst>
           </p:spPr>
@@ -15439,7 +15567,29 @@
                   <a:cs typeface="Helvetica" panose="020B0604020202020204" pitchFamily="34" charset="0"/>
                   <a:sym typeface="Source Sans Pro Light"/>
                 </a:rPr>
-                <a:t>pwcor(), pwcov(), pwNobs() </a:t>
+                <a:t>pwcor(), pwcov(), </a:t>
+              </a:r>
+              <a:r>
+                <a:rPr lang="en-US" sz="900" b="0" dirty="0" err="1" smtClean="0">
+                  <a:solidFill>
+                    <a:srgbClr val="000000"/>
+                  </a:solidFill>
+                  <a:latin typeface="Lucida Console" panose="020B0609040504020204" pitchFamily="49" charset="0"/>
+                  <a:cs typeface="Helvetica" panose="020B0604020202020204" pitchFamily="34" charset="0"/>
+                  <a:sym typeface="Source Sans Pro Light"/>
+                </a:rPr>
+                <a:t>pwnobs</a:t>
+              </a:r>
+              <a:r>
+                <a:rPr lang="en-US" sz="900" b="0" dirty="0" smtClean="0">
+                  <a:solidFill>
+                    <a:srgbClr val="000000"/>
+                  </a:solidFill>
+                  <a:latin typeface="Lucida Console" panose="020B0609040504020204" pitchFamily="49" charset="0"/>
+                  <a:cs typeface="Helvetica" panose="020B0604020202020204" pitchFamily="34" charset="0"/>
+                  <a:sym typeface="Source Sans Pro Light"/>
+                </a:rPr>
+                <a:t>() </a:t>
               </a:r>
               <a:r>
                 <a:rPr lang="en-US" sz="1000" b="0" dirty="0" smtClean="0">
@@ -15495,9 +15645,9 @@
         <p:grpSpPr>
           <a:xfrm>
             <a:off x="10540889" y="9553141"/>
-            <a:ext cx="3168389" cy="937005"/>
+            <a:ext cx="3168389" cy="860061"/>
             <a:chOff x="7124372" y="8961151"/>
-            <a:chExt cx="3168389" cy="937005"/>
+            <a:chExt cx="3168389" cy="860061"/>
           </a:xfrm>
         </p:grpSpPr>
         <p:sp>
@@ -15519,7 +15669,7 @@
             </a:ln>
             <a:extLst>
               <a:ext uri="{C572A759-6A51-4108-AA02-DFA0A04FC94B}">
-                <ma14:wrappingTextBoxFlag xmlns:ma14="http://schemas.microsoft.com/office/mac/drawingml/2011/main" xmlns:a14="http://schemas.microsoft.com/office/drawing/2010/main" xmlns:m="http://schemas.openxmlformats.org/officeDocument/2006/math" xmlns="" val="1"/>
+                <ma14:wrappingTextBoxFlag xmlns="" xmlns:m="http://schemas.openxmlformats.org/officeDocument/2006/math" xmlns:a14="http://schemas.microsoft.com/office/drawing/2010/main" xmlns:ma14="http://schemas.microsoft.com/office/mac/drawingml/2011/main" val="1"/>
               </a:ext>
             </a:extLst>
           </p:spPr>
@@ -15609,7 +15759,7 @@
           <p:spPr>
             <a:xfrm>
               <a:off x="7124372" y="9390325"/>
-              <a:ext cx="3168389" cy="507831"/>
+              <a:ext cx="3168389" cy="430887"/>
             </a:xfrm>
             <a:prstGeom prst="rect">
               <a:avLst/>
@@ -15619,7 +15769,7 @@
             </a:ln>
             <a:extLst>
               <a:ext uri="{C572A759-6A51-4108-AA02-DFA0A04FC94B}">
-                <ma14:wrappingTextBoxFlag xmlns:ma14="http://schemas.microsoft.com/office/mac/drawingml/2011/main" xmlns:a14="http://schemas.microsoft.com/office/drawing/2010/main" xmlns:m="http://schemas.openxmlformats.org/officeDocument/2006/math" xmlns="" val="1"/>
+                <ma14:wrappingTextBoxFlag xmlns="" xmlns:m="http://schemas.openxmlformats.org/officeDocument/2006/math" xmlns:a14="http://schemas.microsoft.com/office/drawing/2010/main" xmlns:ma14="http://schemas.microsoft.com/office/mac/drawingml/2011/main" val="1"/>
               </a:ext>
             </a:extLst>
           </p:spPr>
@@ -15662,7 +15812,40 @@
                   <a:cs typeface="Helvetica" panose="020B0604020202020204" pitchFamily="34" charset="0"/>
                   <a:sym typeface="Source Sans Pro Light"/>
                 </a:rPr>
-                <a:t>.c, Vlabels[&lt;-]</a:t>
+                <a:t>.c, </a:t>
+              </a:r>
+              <a:r>
+                <a:rPr lang="en-US" sz="900" b="0" dirty="0" err="1" smtClean="0">
+                  <a:solidFill>
+                    <a:srgbClr val="000000"/>
+                  </a:solidFill>
+                  <a:latin typeface="Lucida Console" panose="020B0609040504020204" pitchFamily="49" charset="0"/>
+                  <a:cs typeface="Helvetica" panose="020B0604020202020204" pitchFamily="34" charset="0"/>
+                  <a:sym typeface="Source Sans Pro Light"/>
+                </a:rPr>
+                <a:t>Vlabels</a:t>
+              </a:r>
+              <a:r>
+                <a:rPr lang="en-US" sz="900" b="0" dirty="0" smtClean="0">
+                  <a:solidFill>
+                    <a:srgbClr val="000000"/>
+                  </a:solidFill>
+                  <a:latin typeface="Lucida Console" panose="020B0609040504020204" pitchFamily="49" charset="0"/>
+                  <a:cs typeface="Helvetica" panose="020B0604020202020204" pitchFamily="34" charset="0"/>
+                  <a:sym typeface="Source Sans Pro Light"/>
+                </a:rPr>
+                <a:t>[&lt;-], </a:t>
+              </a:r>
+              <a:r>
+                <a:rPr lang="en-US" sz="900" b="0" dirty="0" err="1" smtClean="0">
+                  <a:solidFill>
+                    <a:srgbClr val="000000"/>
+                  </a:solidFill>
+                  <a:latin typeface="Lucida Console" panose="020B0609040504020204" pitchFamily="49" charset="0"/>
+                  <a:cs typeface="Helvetica" panose="020B0604020202020204" pitchFamily="34" charset="0"/>
+                  <a:sym typeface="Source Sans Pro Light"/>
+                </a:rPr>
+                <a:t>namlab</a:t>
               </a:r>
               <a:r>
                 <a:rPr lang="en-US" sz="900" b="0" dirty="0" smtClean="0">
@@ -15672,70 +15855,18 @@
                   <a:latin typeface="Lucida Console" panose="020B0609040504020204" pitchFamily="49" charset="0"/>
                   <a:sym typeface="Source Sans Pro Light"/>
                 </a:rPr>
-                <a:t>, na_omit, ckmatch, add_stub, </a:t>
-              </a:r>
-            </a:p>
-            <a:p>
-              <a:pPr>
-                <a:spcBef>
-                  <a:spcPts val="0"/>
-                </a:spcBef>
-                <a:spcAft>
-                  <a:spcPts val="300"/>
-                </a:spcAft>
-                <a:buClr>
-                  <a:schemeClr val="accent4">
-                    <a:hueOff val="384618"/>
-                    <a:satOff val="3869"/>
-                    <a:lumOff val="5802"/>
-                  </a:schemeClr>
-                </a:buClr>
-                <a:defRPr b="0">
-                  <a:solidFill>
-                    <a:srgbClr val="000000"/>
-                  </a:solidFill>
-                  <a:latin typeface="+mn-lt"/>
-                  <a:ea typeface="+mn-ea"/>
-                  <a:cs typeface="+mn-cs"/>
-                  <a:sym typeface="Source Sans Pro Light"/>
-                </a:defRPr>
-              </a:pPr>
-              <a:r>
-                <a:rPr lang="en-US" sz="900" b="0" dirty="0" smtClean="0">
+                <a:t>, </a:t>
+              </a:r>
+              <a:r>
+                <a:rPr lang="en-US" sz="900" b="0" dirty="0" err="1" smtClean="0">
                   <a:solidFill>
                     <a:srgbClr val="000000"/>
                   </a:solidFill>
                   <a:latin typeface="Lucida Console" panose="020B0609040504020204" pitchFamily="49" charset="0"/>
                   <a:sym typeface="Source Sans Pro Light"/>
                 </a:rPr>
-                <a:t>fnrow, fncol, fdim, fnlevels, seq_row, </a:t>
-              </a:r>
-            </a:p>
-            <a:p>
-              <a:pPr>
-                <a:spcBef>
-                  <a:spcPts val="0"/>
-                </a:spcBef>
-                <a:spcAft>
-                  <a:spcPts val="300"/>
-                </a:spcAft>
-                <a:buClr>
-                  <a:schemeClr val="accent4">
-                    <a:hueOff val="384618"/>
-                    <a:satOff val="3869"/>
-                    <a:lumOff val="5802"/>
-                  </a:schemeClr>
-                </a:buClr>
-                <a:defRPr b="0">
-                  <a:solidFill>
-                    <a:srgbClr val="000000"/>
-                  </a:solidFill>
-                  <a:latin typeface="+mn-lt"/>
-                  <a:ea typeface="+mn-ea"/>
-                  <a:cs typeface="+mn-cs"/>
-                  <a:sym typeface="Source Sans Pro Light"/>
-                </a:defRPr>
-              </a:pPr>
+                <a:t>na_rm</a:t>
+              </a:r>
               <a:r>
                 <a:rPr lang="en-US" sz="900" b="0" dirty="0" smtClean="0">
                   <a:solidFill>
@@ -15744,10 +15875,190 @@
                   <a:latin typeface="Lucida Console" panose="020B0609040504020204" pitchFamily="49" charset="0"/>
                   <a:sym typeface="Source Sans Pro Light"/>
                 </a:rPr>
-                <a:t>seq_col, %!in%, unattrib, copyAttrib, </a:t>
-              </a:r>
-              <a:r>
-                <a:rPr lang="en-US" sz="1000" b="0" dirty="0">
+                <a:t>, </a:t>
+              </a:r>
+              <a:r>
+                <a:rPr lang="en-US" sz="900" b="0" dirty="0" err="1" smtClean="0">
+                  <a:solidFill>
+                    <a:srgbClr val="000000"/>
+                  </a:solidFill>
+                  <a:latin typeface="Lucida Console" panose="020B0609040504020204" pitchFamily="49" charset="0"/>
+                  <a:sym typeface="Source Sans Pro Light"/>
+                </a:rPr>
+                <a:t>na_omit</a:t>
+              </a:r>
+              <a:r>
+                <a:rPr lang="en-US" sz="900" b="0" dirty="0" smtClean="0">
+                  <a:solidFill>
+                    <a:srgbClr val="000000"/>
+                  </a:solidFill>
+                  <a:latin typeface="Lucida Console" panose="020B0609040504020204" pitchFamily="49" charset="0"/>
+                  <a:sym typeface="Source Sans Pro Light"/>
+                </a:rPr>
+                <a:t>, </a:t>
+              </a:r>
+              <a:r>
+                <a:rPr lang="en-US" sz="900" b="0" dirty="0" err="1" smtClean="0">
+                  <a:solidFill>
+                    <a:srgbClr val="000000"/>
+                  </a:solidFill>
+                  <a:latin typeface="Lucida Console" panose="020B0609040504020204" pitchFamily="49" charset="0"/>
+                  <a:sym typeface="Source Sans Pro Light"/>
+                </a:rPr>
+                <a:t>allNA</a:t>
+              </a:r>
+              <a:r>
+                <a:rPr lang="en-US" sz="900" b="0" dirty="0" smtClean="0">
+                  <a:solidFill>
+                    <a:srgbClr val="000000"/>
+                  </a:solidFill>
+                  <a:latin typeface="Lucida Console" panose="020B0609040504020204" pitchFamily="49" charset="0"/>
+                  <a:sym typeface="Source Sans Pro Light"/>
+                </a:rPr>
+                <a:t>, </a:t>
+              </a:r>
+              <a:r>
+                <a:rPr lang="en-US" sz="900" b="0" dirty="0" err="1" smtClean="0">
+                  <a:solidFill>
+                    <a:srgbClr val="000000"/>
+                  </a:solidFill>
+                  <a:latin typeface="Lucida Console" panose="020B0609040504020204" pitchFamily="49" charset="0"/>
+                  <a:sym typeface="Source Sans Pro Light"/>
+                </a:rPr>
+                <a:t>missing_cases</a:t>
+              </a:r>
+              <a:r>
+                <a:rPr lang="en-US" sz="900" b="0" dirty="0" smtClean="0">
+                  <a:solidFill>
+                    <a:srgbClr val="000000"/>
+                  </a:solidFill>
+                  <a:latin typeface="Lucida Console" panose="020B0609040504020204" pitchFamily="49" charset="0"/>
+                  <a:sym typeface="Source Sans Pro Light"/>
+                </a:rPr>
+                <a:t>, </a:t>
+              </a:r>
+              <a:r>
+                <a:rPr lang="en-US" sz="900" b="0" dirty="0" err="1" smtClean="0">
+                  <a:solidFill>
+                    <a:srgbClr val="000000"/>
+                  </a:solidFill>
+                  <a:latin typeface="Lucida Console" panose="020B0609040504020204" pitchFamily="49" charset="0"/>
+                  <a:sym typeface="Source Sans Pro Light"/>
+                </a:rPr>
+                <a:t>ckmatch</a:t>
+              </a:r>
+              <a:r>
+                <a:rPr lang="en-US" sz="900" b="0" dirty="0" smtClean="0">
+                  <a:solidFill>
+                    <a:srgbClr val="000000"/>
+                  </a:solidFill>
+                  <a:latin typeface="Lucida Console" panose="020B0609040504020204" pitchFamily="49" charset="0"/>
+                  <a:sym typeface="Source Sans Pro Light"/>
+                </a:rPr>
+                <a:t>, </a:t>
+              </a:r>
+              <a:r>
+                <a:rPr lang="en-US" sz="900" b="0" dirty="0" err="1" smtClean="0">
+                  <a:solidFill>
+                    <a:srgbClr val="000000"/>
+                  </a:solidFill>
+                  <a:latin typeface="Lucida Console" panose="020B0609040504020204" pitchFamily="49" charset="0"/>
+                  <a:sym typeface="Source Sans Pro Light"/>
+                </a:rPr>
+                <a:t>add_stub</a:t>
+              </a:r>
+              <a:r>
+                <a:rPr lang="en-US" sz="900" b="0" dirty="0" smtClean="0">
+                  <a:solidFill>
+                    <a:srgbClr val="000000"/>
+                  </a:solidFill>
+                  <a:latin typeface="Lucida Console" panose="020B0609040504020204" pitchFamily="49" charset="0"/>
+                  <a:sym typeface="Source Sans Pro Light"/>
+                </a:rPr>
+                <a:t>, </a:t>
+              </a:r>
+              <a:r>
+                <a:rPr lang="en-US" sz="900" b="0" dirty="0" err="1" smtClean="0">
+                  <a:solidFill>
+                    <a:srgbClr val="000000"/>
+                  </a:solidFill>
+                  <a:latin typeface="Lucida Console" panose="020B0609040504020204" pitchFamily="49" charset="0"/>
+                  <a:sym typeface="Source Sans Pro Light"/>
+                </a:rPr>
+                <a:t>rm_stub</a:t>
+              </a:r>
+              <a:r>
+                <a:rPr lang="en-US" sz="900" b="0" dirty="0" smtClean="0">
+                  <a:solidFill>
+                    <a:srgbClr val="000000"/>
+                  </a:solidFill>
+                  <a:latin typeface="Lucida Console" panose="020B0609040504020204" pitchFamily="49" charset="0"/>
+                  <a:sym typeface="Source Sans Pro Light"/>
+                </a:rPr>
+                <a:t>, </a:t>
+              </a:r>
+              <a:r>
+                <a:rPr lang="en-US" sz="900" b="0" dirty="0" err="1" smtClean="0">
+                  <a:solidFill>
+                    <a:srgbClr val="000000"/>
+                  </a:solidFill>
+                  <a:latin typeface="Lucida Console" panose="020B0609040504020204" pitchFamily="49" charset="0"/>
+                  <a:sym typeface="Source Sans Pro Light"/>
+                </a:rPr>
+                <a:t>fnrow</a:t>
+              </a:r>
+              <a:r>
+                <a:rPr lang="en-US" sz="900" b="0" dirty="0" smtClean="0">
+                  <a:solidFill>
+                    <a:srgbClr val="000000"/>
+                  </a:solidFill>
+                  <a:latin typeface="Lucida Console" panose="020B0609040504020204" pitchFamily="49" charset="0"/>
+                  <a:sym typeface="Source Sans Pro Light"/>
+                </a:rPr>
+                <a:t>, </a:t>
+              </a:r>
+              <a:r>
+                <a:rPr lang="en-US" sz="900" b="0" dirty="0" err="1" smtClean="0">
+                  <a:solidFill>
+                    <a:srgbClr val="000000"/>
+                  </a:solidFill>
+                  <a:latin typeface="Lucida Console" panose="020B0609040504020204" pitchFamily="49" charset="0"/>
+                  <a:sym typeface="Source Sans Pro Light"/>
+                </a:rPr>
+                <a:t>seq_row</a:t>
+              </a:r>
+              <a:r>
+                <a:rPr lang="en-US" sz="900" b="0" dirty="0" smtClean="0">
+                  <a:solidFill>
+                    <a:srgbClr val="000000"/>
+                  </a:solidFill>
+                  <a:latin typeface="Lucida Console" panose="020B0609040504020204" pitchFamily="49" charset="0"/>
+                  <a:sym typeface="Source Sans Pro Light"/>
+                </a:rPr>
+                <a:t>, %!in%, </a:t>
+              </a:r>
+              <a:r>
+                <a:rPr lang="en-US" sz="900" b="0" dirty="0" err="1" smtClean="0">
+                  <a:solidFill>
+                    <a:srgbClr val="000000"/>
+                  </a:solidFill>
+                  <a:latin typeface="Lucida Console" panose="020B0609040504020204" pitchFamily="49" charset="0"/>
+                  <a:sym typeface="Source Sans Pro Light"/>
+                </a:rPr>
+                <a:t>unattrib</a:t>
+              </a:r>
+              <a:r>
+                <a:rPr lang="en-US" sz="900" b="0" dirty="0" smtClean="0">
+                  <a:solidFill>
+                    <a:srgbClr val="000000"/>
+                  </a:solidFill>
+                  <a:latin typeface="Lucida Console" panose="020B0609040504020204" pitchFamily="49" charset="0"/>
+                  <a:sym typeface="Source Sans Pro Light"/>
+                </a:rPr>
+                <a:t> </a:t>
+              </a:r>
+              <a:r>
+                <a:rPr lang="en-US" sz="1000" b="0" dirty="0" smtClean="0">
                   <a:solidFill>
                     <a:srgbClr val="000000"/>
                   </a:solidFill>
@@ -15756,7 +16067,19 @@
                   <a:cs typeface="+mn-cs"/>
                   <a:sym typeface="Source Sans Pro Light"/>
                 </a:rPr>
-                <a:t>etc...</a:t>
+                <a:t>etc</a:t>
+              </a:r>
+              <a:r>
+                <a:rPr lang="en-US" sz="1000" b="0" dirty="0">
+                  <a:solidFill>
+                    <a:srgbClr val="000000"/>
+                  </a:solidFill>
+                  <a:latin typeface="+mn-lt"/>
+                  <a:ea typeface="+mn-ea"/>
+                  <a:cs typeface="+mn-cs"/>
+                  <a:sym typeface="Source Sans Pro Light"/>
+                </a:rPr>
+                <a:t>...</a:t>
               </a:r>
             </a:p>
           </p:txBody>
@@ -15771,9 +16094,9 @@
         <p:grpSpPr>
           <a:xfrm>
             <a:off x="10540889" y="8330534"/>
-            <a:ext cx="3168389" cy="1137060"/>
+            <a:ext cx="3266203" cy="1160143"/>
             <a:chOff x="7124372" y="8961151"/>
-            <a:chExt cx="3168389" cy="1137060"/>
+            <a:chExt cx="3266203" cy="1160143"/>
           </a:xfrm>
         </p:grpSpPr>
         <p:sp>
@@ -15795,7 +16118,7 @@
             </a:ln>
             <a:extLst>
               <a:ext uri="{C572A759-6A51-4108-AA02-DFA0A04FC94B}">
-                <ma14:wrappingTextBoxFlag xmlns:ma14="http://schemas.microsoft.com/office/mac/drawingml/2011/main" xmlns:a14="http://schemas.microsoft.com/office/drawing/2010/main" xmlns:m="http://schemas.openxmlformats.org/officeDocument/2006/math" xmlns="" val="1"/>
+                <ma14:wrappingTextBoxFlag xmlns="" xmlns:m="http://schemas.openxmlformats.org/officeDocument/2006/math" xmlns:a14="http://schemas.microsoft.com/office/drawing/2010/main" xmlns:ma14="http://schemas.microsoft.com/office/mac/drawingml/2011/main" val="1"/>
               </a:ext>
             </a:extLst>
           </p:spPr>
@@ -15885,7 +16208,7 @@
           <p:spPr>
             <a:xfrm>
               <a:off x="7124372" y="9390325"/>
-              <a:ext cx="3168389" cy="707886"/>
+              <a:ext cx="3266203" cy="730969"/>
             </a:xfrm>
             <a:prstGeom prst="rect">
               <a:avLst/>
@@ -15895,7 +16218,7 @@
             </a:ln>
             <a:extLst>
               <a:ext uri="{C572A759-6A51-4108-AA02-DFA0A04FC94B}">
-                <ma14:wrappingTextBoxFlag xmlns:ma14="http://schemas.microsoft.com/office/mac/drawingml/2011/main" xmlns:a14="http://schemas.microsoft.com/office/drawing/2010/main" xmlns:m="http://schemas.openxmlformats.org/officeDocument/2006/math" xmlns="" val="1"/>
+                <ma14:wrappingTextBoxFlag xmlns="" xmlns:m="http://schemas.openxmlformats.org/officeDocument/2006/math" xmlns:a14="http://schemas.microsoft.com/office/drawing/2010/main" xmlns:ma14="http://schemas.microsoft.com/office/mac/drawingml/2011/main" val="1"/>
               </a:ext>
             </a:extLst>
           </p:spPr>
@@ -15987,7 +16310,7 @@
                 </a:defRPr>
               </a:pPr>
               <a:r>
-                <a:rPr lang="en-US" sz="900" b="0" dirty="0" smtClean="0">
+                <a:rPr lang="en-US" sz="900" b="0" dirty="0" err="1" smtClean="0">
                   <a:solidFill>
                     <a:srgbClr val="000000"/>
                   </a:solidFill>
@@ -15996,16 +16319,163 @@
                   <a:cs typeface="Helvetica" panose="020B0604020202020204" pitchFamily="34" charset="0"/>
                   <a:sym typeface="Source Sans Pro Light"/>
                 </a:rPr>
-                <a:t>replace_NA(), replace_Inf(), replace_outliers() </a:t>
-              </a:r>
-              <a:r>
-                <a:rPr lang="en-US" sz="1000" b="0" dirty="0" smtClean="0">
-                  <a:solidFill>
-                    <a:srgbClr val="000000"/>
-                  </a:solidFill>
+                <a:t>replace_NA</a:t>
+              </a:r>
+              <a:r>
+                <a:rPr lang="en-US" sz="900" b="0" dirty="0" smtClean="0">
+                  <a:solidFill>
+                    <a:srgbClr val="000000"/>
+                  </a:solidFill>
+                  <a:latin typeface="Lucida Console" panose="020B0609040504020204" pitchFamily="49" charset="0"/>
+                  <a:ea typeface="+mn-ea"/>
+                  <a:cs typeface="Helvetica" panose="020B0604020202020204" pitchFamily="34" charset="0"/>
                   <a:sym typeface="Source Sans Pro Light"/>
                 </a:rPr>
-                <a:t>–  replace matching values</a:t>
+                <a:t>(),</a:t>
+              </a:r>
+              <a:r>
+                <a:rPr lang="en-US" sz="900" b="0" dirty="0" smtClean="0">
+                  <a:solidFill>
+                    <a:srgbClr val="000000"/>
+                  </a:solidFill>
+                  <a:latin typeface="Lucida Console" panose="020B0609040504020204" pitchFamily="49" charset="0"/>
+                  <a:cs typeface="Helvetica" panose="020B0604020202020204" pitchFamily="34" charset="0"/>
+                  <a:sym typeface="Source Sans Pro Light"/>
+                </a:rPr>
+                <a:t> </a:t>
+              </a:r>
+              <a:r>
+                <a:rPr lang="en-US" sz="900" b="0" dirty="0" err="1">
+                  <a:solidFill>
+                    <a:srgbClr val="000000"/>
+                  </a:solidFill>
+                  <a:latin typeface="Lucida Console" panose="020B0609040504020204" pitchFamily="49" charset="0"/>
+                  <a:cs typeface="Helvetica" panose="020B0604020202020204" pitchFamily="34" charset="0"/>
+                  <a:sym typeface="Source Sans Pro Light"/>
+                </a:rPr>
+                <a:t>replace_Inf</a:t>
+              </a:r>
+              <a:r>
+                <a:rPr lang="en-US" sz="900" b="0" dirty="0" smtClean="0">
+                  <a:solidFill>
+                    <a:srgbClr val="000000"/>
+                  </a:solidFill>
+                  <a:latin typeface="Lucida Console" panose="020B0609040504020204" pitchFamily="49" charset="0"/>
+                  <a:cs typeface="Helvetica" panose="020B0604020202020204" pitchFamily="34" charset="0"/>
+                  <a:sym typeface="Source Sans Pro Light"/>
+                </a:rPr>
+                <a:t>()</a:t>
+              </a:r>
+              <a:r>
+                <a:rPr lang="en-US" sz="900" b="0" dirty="0" smtClean="0">
+                  <a:solidFill>
+                    <a:srgbClr val="000000"/>
+                  </a:solidFill>
+                  <a:latin typeface="Lucida Console" panose="020B0609040504020204" pitchFamily="49" charset="0"/>
+                  <a:ea typeface="+mn-ea"/>
+                  <a:cs typeface="Helvetica" panose="020B0604020202020204" pitchFamily="34" charset="0"/>
+                  <a:sym typeface="Source Sans Pro Light"/>
+                </a:rPr>
+                <a:t>, </a:t>
+              </a:r>
+              <a:r>
+                <a:rPr lang="en-US" sz="900" b="0" dirty="0" err="1" smtClean="0">
+                  <a:solidFill>
+                    <a:srgbClr val="000000"/>
+                  </a:solidFill>
+                  <a:latin typeface="Lucida Console" panose="020B0609040504020204" pitchFamily="49" charset="0"/>
+                  <a:cs typeface="Helvetica" panose="020B0604020202020204" pitchFamily="34" charset="0"/>
+                  <a:sym typeface="Source Sans Pro Light"/>
+                </a:rPr>
+                <a:t>replace_outliers</a:t>
+              </a:r>
+              <a:r>
+                <a:rPr lang="en-US" sz="900" b="0" dirty="0" smtClean="0">
+                  <a:solidFill>
+                    <a:srgbClr val="000000"/>
+                  </a:solidFill>
+                  <a:latin typeface="Lucida Console" panose="020B0609040504020204" pitchFamily="49" charset="0"/>
+                  <a:cs typeface="Helvetica" panose="020B0604020202020204" pitchFamily="34" charset="0"/>
+                  <a:sym typeface="Source Sans Pro Light"/>
+                </a:rPr>
+                <a:t>()</a:t>
+              </a:r>
+            </a:p>
+            <a:p>
+              <a:pPr>
+                <a:spcBef>
+                  <a:spcPts val="0"/>
+                </a:spcBef>
+                <a:spcAft>
+                  <a:spcPts val="300"/>
+                </a:spcAft>
+                <a:buClr>
+                  <a:schemeClr val="accent4">
+                    <a:hueOff val="384618"/>
+                    <a:satOff val="3869"/>
+                    <a:lumOff val="5802"/>
+                  </a:schemeClr>
+                </a:buClr>
+                <a:defRPr b="0">
+                  <a:solidFill>
+                    <a:srgbClr val="000000"/>
+                  </a:solidFill>
+                  <a:latin typeface="+mn-lt"/>
+                  <a:ea typeface="+mn-ea"/>
+                  <a:cs typeface="+mn-cs"/>
+                  <a:sym typeface="Source Sans Pro Light"/>
+                </a:defRPr>
+              </a:pPr>
+              <a:r>
+                <a:rPr lang="en-US" sz="900" b="0" dirty="0">
+                  <a:solidFill>
+                    <a:srgbClr val="000000"/>
+                  </a:solidFill>
+                  <a:sym typeface="Source Sans Pro Light"/>
+                </a:rPr>
+                <a:t>–  </a:t>
+              </a:r>
+              <a:r>
+                <a:rPr lang="en-US" sz="900" b="0" dirty="0" smtClean="0">
+                  <a:solidFill>
+                    <a:srgbClr val="000000"/>
+                  </a:solidFill>
+                  <a:sym typeface="Source Sans Pro Light"/>
+                </a:rPr>
+                <a:t>replace special values</a:t>
+              </a:r>
+              <a:r>
+                <a:rPr lang="en-US" sz="900" b="0" dirty="0">
+                  <a:solidFill>
+                    <a:srgbClr val="000000"/>
+                  </a:solidFill>
+                  <a:latin typeface="Lucida Console" panose="020B0609040504020204" pitchFamily="49" charset="0"/>
+                  <a:ea typeface="+mn-ea"/>
+                  <a:cs typeface="Helvetica" panose="020B0604020202020204" pitchFamily="34" charset="0"/>
+                  <a:sym typeface="Source Sans Pro Light"/>
+                </a:rPr>
+                <a:t> </a:t>
+              </a:r>
+              <a:r>
+                <a:rPr lang="en-US" sz="900" b="0" dirty="0" smtClean="0">
+                  <a:solidFill>
+                    <a:srgbClr val="000000"/>
+                  </a:solidFill>
+                  <a:latin typeface="Lucida Console" panose="020B0609040504020204" pitchFamily="49" charset="0"/>
+                  <a:ea typeface="+mn-ea"/>
+                  <a:cs typeface="Helvetica" panose="020B0604020202020204" pitchFamily="34" charset="0"/>
+                  <a:sym typeface="Source Sans Pro Light"/>
+                </a:rPr>
+                <a:t>  pad() </a:t>
+              </a:r>
+              <a:r>
+                <a:rPr lang="en-US" sz="1000" b="0" dirty="0" smtClean="0">
+                  <a:solidFill>
+                    <a:srgbClr val="000000"/>
+                  </a:solidFill>
+                  <a:sym typeface="Source Sans Pro Light"/>
+                </a:rPr>
+                <a:t>–  add observations / rows. </a:t>
               </a:r>
             </a:p>
             <a:p>
@@ -16076,7 +16546,7 @@
             </a:ln>
             <a:extLst>
               <a:ext uri="{C572A759-6A51-4108-AA02-DFA0A04FC94B}">
-                <ma14:wrappingTextBoxFlag xmlns:ma14="http://schemas.microsoft.com/office/mac/drawingml/2011/main" xmlns:a14="http://schemas.microsoft.com/office/drawing/2010/main" xmlns:m="http://schemas.openxmlformats.org/officeDocument/2006/math" xmlns="" val="1"/>
+                <ma14:wrappingTextBoxFlag xmlns="" xmlns:m="http://schemas.openxmlformats.org/officeDocument/2006/math" xmlns:a14="http://schemas.microsoft.com/office/drawing/2010/main" xmlns:ma14="http://schemas.microsoft.com/office/mac/drawingml/2011/main" val="1"/>
               </a:ext>
             </a:extLst>
           </p:spPr>
@@ -16199,7 +16669,7 @@
             </a:ln>
             <a:extLst>
               <a:ext uri="{C572A759-6A51-4108-AA02-DFA0A04FC94B}">
-                <ma14:wrappingTextBoxFlag xmlns:ma14="http://schemas.microsoft.com/office/mac/drawingml/2011/main" xmlns:a14="http://schemas.microsoft.com/office/drawing/2010/main" xmlns:m="http://schemas.openxmlformats.org/officeDocument/2006/math" xmlns="" val="1"/>
+                <ma14:wrappingTextBoxFlag xmlns="" xmlns:m="http://schemas.openxmlformats.org/officeDocument/2006/math" xmlns:a14="http://schemas.microsoft.com/office/drawing/2010/main" xmlns:ma14="http://schemas.microsoft.com/office/mac/drawingml/2011/main" val="1"/>
               </a:ext>
             </a:extLst>
           </p:spPr>
@@ -16467,13 +16937,31 @@
                 </a:defRPr>
               </a:pPr>
               <a:r>
-                <a:rPr lang="en-US" sz="900" b="0" dirty="0" smtClean="0">
+                <a:rPr lang="en-US" sz="900" b="0" dirty="0" err="1">
                   <a:solidFill>
                     <a:srgbClr val="000000"/>
                   </a:solidFill>
                   <a:latin typeface="Lucida Console" panose="020B0609040504020204" pitchFamily="49" charset="0"/>
                 </a:rPr>
-                <a:t>fcompute()</a:t>
+                <a:t>fcompute</a:t>
+              </a:r>
+              <a:r>
+                <a:rPr lang="en-US" sz="900" b="0" dirty="0">
+                  <a:solidFill>
+                    <a:srgbClr val="000000"/>
+                  </a:solidFill>
+                  <a:latin typeface="Lucida Console" panose="020B0609040504020204" pitchFamily="49" charset="0"/>
+                </a:rPr>
+                <a:t>[v</a:t>
+              </a:r>
+              <a:r>
+                <a:rPr lang="en-US" sz="900" b="0" dirty="0" smtClean="0">
+                  <a:solidFill>
+                    <a:srgbClr val="000000"/>
+                  </a:solidFill>
+                  <a:latin typeface="Lucida Console" panose="020B0609040504020204" pitchFamily="49" charset="0"/>
+                </a:rPr>
+                <a:t>]()</a:t>
               </a:r>
               <a:r>
                 <a:rPr lang="en-US" sz="1100" dirty="0" smtClean="0"/>
@@ -16492,7 +16980,7 @@
                   <a:ea typeface="+mn-ea"/>
                   <a:cs typeface="+mn-cs"/>
                 </a:rPr>
-                <a:t> compute new cols discarding existing ones</a:t>
+                <a:t> compute new cols dropping existing ones</a:t>
               </a:r>
             </a:p>
             <a:p>
@@ -16667,13 +17155,31 @@
                 </a:defRPr>
               </a:pPr>
               <a:r>
-                <a:rPr lang="en-US" sz="900" b="0" dirty="0" smtClean="0">
+                <a:rPr lang="en-US" sz="900" b="0" dirty="0" err="1">
                   <a:solidFill>
                     <a:srgbClr val="000000"/>
                   </a:solidFill>
                   <a:latin typeface="Lucida Console" panose="020B0609040504020204" pitchFamily="49" charset="0"/>
                 </a:rPr>
-                <a:t>Date_vars[&lt;-]()</a:t>
+                <a:t>d</a:t>
+              </a:r>
+              <a:r>
+                <a:rPr lang="en-US" sz="900" b="0" dirty="0" err="1" smtClean="0">
+                  <a:solidFill>
+                    <a:srgbClr val="000000"/>
+                  </a:solidFill>
+                  <a:latin typeface="Lucida Console" panose="020B0609040504020204" pitchFamily="49" charset="0"/>
+                </a:rPr>
+                <a:t>ate_vars</a:t>
+              </a:r>
+              <a:r>
+                <a:rPr lang="en-US" sz="900" b="0" dirty="0" smtClean="0">
+                  <a:solidFill>
+                    <a:srgbClr val="000000"/>
+                  </a:solidFill>
+                  <a:latin typeface="Lucida Console" panose="020B0609040504020204" pitchFamily="49" charset="0"/>
+                </a:rPr>
+                <a:t>[&lt;-]()</a:t>
               </a:r>
               <a:r>
                 <a:rPr lang="en-US" sz="1000" dirty="0" smtClean="0">

</xml_diff>

<commit_message>
Minor tweak to cheatsheet.
</commit_message>
<xml_diff>
--- a/misc/collapse cheat sheet/collapse.pptx
+++ b/misc/collapse cheat sheet/collapse.pptx
@@ -2206,7 +2206,7 @@
           </a:ln>
           <a:extLst>
             <a:ext uri="{C572A759-6A51-4108-AA02-DFA0A04FC94B}">
-              <ma14:wrappingTextBoxFlag xmlns="" xmlns:m="http://schemas.openxmlformats.org/officeDocument/2006/math" xmlns:a14="http://schemas.microsoft.com/office/drawing/2010/main" xmlns:ma14="http://schemas.microsoft.com/office/mac/drawingml/2011/main" val="1"/>
+              <ma14:wrappingTextBoxFlag xmlns:ma14="http://schemas.microsoft.com/office/mac/drawingml/2011/main" xmlns:a14="http://schemas.microsoft.com/office/drawing/2010/main" xmlns:m="http://schemas.openxmlformats.org/officeDocument/2006/math" xmlns="" val="1"/>
             </a:ext>
           </a:extLst>
         </p:spPr>
@@ -2245,7 +2245,7 @@
           </a:ln>
           <a:extLst>
             <a:ext uri="{C572A759-6A51-4108-AA02-DFA0A04FC94B}">
-              <ma14:wrappingTextBoxFlag xmlns="" xmlns:m="http://schemas.openxmlformats.org/officeDocument/2006/math" xmlns:a14="http://schemas.microsoft.com/office/drawing/2010/main" xmlns:ma14="http://schemas.microsoft.com/office/mac/drawingml/2011/main" val="1"/>
+              <ma14:wrappingTextBoxFlag xmlns:ma14="http://schemas.microsoft.com/office/mac/drawingml/2011/main" xmlns:a14="http://schemas.microsoft.com/office/drawing/2010/main" xmlns:m="http://schemas.openxmlformats.org/officeDocument/2006/math" xmlns="" val="1"/>
             </a:ext>
           </a:extLst>
         </p:spPr>
@@ -4098,7 +4098,7 @@
           </a:ln>
           <a:extLst>
             <a:ext uri="{C572A759-6A51-4108-AA02-DFA0A04FC94B}">
-              <ma14:wrappingTextBoxFlag xmlns="" xmlns:m="http://schemas.openxmlformats.org/officeDocument/2006/math" xmlns:a14="http://schemas.microsoft.com/office/drawing/2010/main" xmlns:ma14="http://schemas.microsoft.com/office/mac/drawingml/2011/main" val="1"/>
+              <ma14:wrappingTextBoxFlag xmlns:ma14="http://schemas.microsoft.com/office/mac/drawingml/2011/main" xmlns:a14="http://schemas.microsoft.com/office/drawing/2010/main" xmlns:m="http://schemas.openxmlformats.org/officeDocument/2006/math" xmlns="" val="1"/>
             </a:ext>
           </a:extLst>
         </p:spPr>
@@ -5329,8 +5329,77 @@
                 <a:cs typeface="+mn-cs"/>
                 <a:sym typeface="Source Sans Pro Light"/>
               </a:rPr>
-              <a:t>Fast functions to perform time-based computations on (unordered) time series and (unbalanced) panels</a:t>
-            </a:r>
+              <a:t>Fast functions to perform time-based computations on </a:t>
+            </a:r>
+            <a:r>
+              <a:rPr lang="en-US" sz="1100" b="0" dirty="0" smtClean="0">
+                <a:solidFill>
+                  <a:srgbClr val="000000"/>
+                </a:solidFill>
+                <a:latin typeface="Source Sans Pro" panose="020B0503030403020204" pitchFamily="34" charset="0"/>
+                <a:ea typeface="Source Sans Pro" panose="020B0503030403020204" pitchFamily="34" charset="0"/>
+                <a:cs typeface="+mn-cs"/>
+                <a:sym typeface="Source Sans Pro Light"/>
+              </a:rPr>
+              <a:t>(</a:t>
+            </a:r>
+            <a:r>
+              <a:rPr lang="en-US" sz="1100" b="0" dirty="0" smtClean="0">
+                <a:solidFill>
+                  <a:srgbClr val="000000"/>
+                </a:solidFill>
+                <a:latin typeface="Source Sans Pro" panose="020B0503030403020204" pitchFamily="34" charset="0"/>
+                <a:ea typeface="Source Sans Pro" panose="020B0503030403020204" pitchFamily="34" charset="0"/>
+                <a:cs typeface="+mn-cs"/>
+                <a:sym typeface="Source Sans Pro Light"/>
+              </a:rPr>
+              <a:t>irregular</a:t>
+            </a:r>
+            <a:r>
+              <a:rPr lang="en-US" sz="1100" b="0" dirty="0" smtClean="0">
+                <a:solidFill>
+                  <a:srgbClr val="000000"/>
+                </a:solidFill>
+                <a:latin typeface="Source Sans Pro" panose="020B0503030403020204" pitchFamily="34" charset="0"/>
+                <a:ea typeface="Source Sans Pro" panose="020B0503030403020204" pitchFamily="34" charset="0"/>
+                <a:cs typeface="+mn-cs"/>
+                <a:sym typeface="Source Sans Pro Light"/>
+              </a:rPr>
+              <a:t>) </a:t>
+            </a:r>
+            <a:r>
+              <a:rPr lang="en-US" sz="1100" b="0" dirty="0" smtClean="0">
+                <a:solidFill>
+                  <a:srgbClr val="000000"/>
+                </a:solidFill>
+                <a:latin typeface="Source Sans Pro" panose="020B0503030403020204" pitchFamily="34" charset="0"/>
+                <a:ea typeface="Source Sans Pro" panose="020B0503030403020204" pitchFamily="34" charset="0"/>
+                <a:cs typeface="+mn-cs"/>
+                <a:sym typeface="Source Sans Pro Light"/>
+              </a:rPr>
+              <a:t>time series and (unbalanced) </a:t>
+            </a:r>
+            <a:r>
+              <a:rPr lang="en-US" sz="1100" b="0" dirty="0" smtClean="0">
+                <a:solidFill>
+                  <a:srgbClr val="000000"/>
+                </a:solidFill>
+                <a:latin typeface="Source Sans Pro" panose="020B0503030403020204" pitchFamily="34" charset="0"/>
+                <a:ea typeface="Source Sans Pro" panose="020B0503030403020204" pitchFamily="34" charset="0"/>
+                <a:cs typeface="+mn-cs"/>
+                <a:sym typeface="Source Sans Pro Light"/>
+              </a:rPr>
+              <a:t>panel data</a:t>
+            </a:r>
+            <a:endParaRPr lang="en-US" sz="1100" b="0" dirty="0" smtClean="0">
+              <a:solidFill>
+                <a:srgbClr val="000000"/>
+              </a:solidFill>
+              <a:latin typeface="Source Sans Pro" panose="020B0503030403020204" pitchFamily="34" charset="0"/>
+              <a:ea typeface="Source Sans Pro" panose="020B0503030403020204" pitchFamily="34" charset="0"/>
+              <a:cs typeface="+mn-cs"/>
+              <a:sym typeface="Source Sans Pro Light"/>
+            </a:endParaRPr>
           </a:p>
           <a:p>
             <a:pPr>
@@ -5998,7 +6067,7 @@
           </a:ln>
           <a:extLst>
             <a:ext uri="{C572A759-6A51-4108-AA02-DFA0A04FC94B}">
-              <ma14:wrappingTextBoxFlag xmlns="" xmlns:m="http://schemas.openxmlformats.org/officeDocument/2006/math" xmlns:a14="http://schemas.microsoft.com/office/drawing/2010/main" xmlns:ma14="http://schemas.microsoft.com/office/mac/drawingml/2011/main" val="1"/>
+              <ma14:wrappingTextBoxFlag xmlns:ma14="http://schemas.microsoft.com/office/mac/drawingml/2011/main" xmlns:a14="http://schemas.microsoft.com/office/drawing/2010/main" xmlns:m="http://schemas.openxmlformats.org/officeDocument/2006/math" xmlns="" val="1"/>
             </a:ext>
           </a:extLst>
         </p:spPr>
@@ -6180,7 +6249,7 @@
             </a:ln>
             <a:extLst>
               <a:ext uri="{C572A759-6A51-4108-AA02-DFA0A04FC94B}">
-                <ma14:wrappingTextBoxFlag xmlns="" xmlns:m="http://schemas.openxmlformats.org/officeDocument/2006/math" xmlns:a14="http://schemas.microsoft.com/office/drawing/2010/main" xmlns:ma14="http://schemas.microsoft.com/office/mac/drawingml/2011/main" val="1"/>
+                <ma14:wrappingTextBoxFlag xmlns:ma14="http://schemas.microsoft.com/office/mac/drawingml/2011/main" xmlns:a14="http://schemas.microsoft.com/office/drawing/2010/main" xmlns:m="http://schemas.openxmlformats.org/officeDocument/2006/math" xmlns="" val="1"/>
               </a:ext>
             </a:extLst>
           </p:spPr>
@@ -6324,7 +6393,7 @@
           </a:ln>
           <a:extLst>
             <a:ext uri="{C572A759-6A51-4108-AA02-DFA0A04FC94B}">
-              <ma14:wrappingTextBoxFlag xmlns="" xmlns:m="http://schemas.openxmlformats.org/officeDocument/2006/math" xmlns:a14="http://schemas.microsoft.com/office/drawing/2010/main" xmlns:ma14="http://schemas.microsoft.com/office/mac/drawingml/2011/main" val="1"/>
+              <ma14:wrappingTextBoxFlag xmlns:ma14="http://schemas.microsoft.com/office/mac/drawingml/2011/main" xmlns:a14="http://schemas.microsoft.com/office/drawing/2010/main" xmlns:m="http://schemas.openxmlformats.org/officeDocument/2006/math" xmlns="" val="1"/>
             </a:ext>
           </a:extLst>
         </p:spPr>
@@ -6639,7 +6708,7 @@
           </a:ln>
           <a:extLst>
             <a:ext uri="{C572A759-6A51-4108-AA02-DFA0A04FC94B}">
-              <ma14:wrappingTextBoxFlag xmlns="" xmlns:m="http://schemas.openxmlformats.org/officeDocument/2006/math" xmlns:a14="http://schemas.microsoft.com/office/drawing/2010/main" xmlns:ma14="http://schemas.microsoft.com/office/mac/drawingml/2011/main" val="1"/>
+              <ma14:wrappingTextBoxFlag xmlns:ma14="http://schemas.microsoft.com/office/mac/drawingml/2011/main" xmlns:a14="http://schemas.microsoft.com/office/drawing/2010/main" xmlns:m="http://schemas.openxmlformats.org/officeDocument/2006/math" xmlns="" val="1"/>
             </a:ext>
           </a:extLst>
         </p:spPr>
@@ -6690,7 +6759,7 @@
           </a:ln>
           <a:extLst>
             <a:ext uri="{C572A759-6A51-4108-AA02-DFA0A04FC94B}">
-              <ma14:wrappingTextBoxFlag xmlns="" xmlns:m="http://schemas.openxmlformats.org/officeDocument/2006/math" xmlns:a14="http://schemas.microsoft.com/office/drawing/2010/main" xmlns:ma14="http://schemas.microsoft.com/office/mac/drawingml/2011/main" val="1"/>
+              <ma14:wrappingTextBoxFlag xmlns:ma14="http://schemas.microsoft.com/office/mac/drawingml/2011/main" xmlns:a14="http://schemas.microsoft.com/office/drawing/2010/main" xmlns:m="http://schemas.openxmlformats.org/officeDocument/2006/math" xmlns="" val="1"/>
             </a:ext>
           </a:extLst>
         </p:spPr>
@@ -7893,7 +7962,7 @@
             <a:effectLst/>
             <a:extLst>
               <a:ext uri="{C572A759-6A51-4108-AA02-DFA0A04FC94B}">
-                <ma14:wrappingTextBoxFlag xmlns="" xmlns:m="http://schemas.openxmlformats.org/officeDocument/2006/math" xmlns:a14="http://schemas.microsoft.com/office/drawing/2010/main" xmlns:ma14="http://schemas.microsoft.com/office/mac/drawingml/2011/main" val="1"/>
+                <ma14:wrappingTextBoxFlag xmlns:ma14="http://schemas.microsoft.com/office/mac/drawingml/2011/main" xmlns:a14="http://schemas.microsoft.com/office/drawing/2010/main" xmlns:m="http://schemas.openxmlformats.org/officeDocument/2006/math" xmlns="" val="1"/>
               </a:ext>
             </a:extLst>
           </p:spPr>
@@ -7993,7 +8062,7 @@
           </a:ln>
           <a:extLst>
             <a:ext uri="{C572A759-6A51-4108-AA02-DFA0A04FC94B}">
-              <ma14:wrappingTextBoxFlag xmlns="" xmlns:m="http://schemas.openxmlformats.org/officeDocument/2006/math" xmlns:a14="http://schemas.microsoft.com/office/drawing/2010/main" xmlns:ma14="http://schemas.microsoft.com/office/mac/drawingml/2011/main" val="1"/>
+              <ma14:wrappingTextBoxFlag xmlns:ma14="http://schemas.microsoft.com/office/mac/drawingml/2011/main" xmlns:a14="http://schemas.microsoft.com/office/drawing/2010/main" xmlns:m="http://schemas.openxmlformats.org/officeDocument/2006/math" xmlns="" val="1"/>
             </a:ext>
           </a:extLst>
         </p:spPr>
@@ -8093,7 +8162,7 @@
           </a:ln>
           <a:extLst>
             <a:ext uri="{C572A759-6A51-4108-AA02-DFA0A04FC94B}">
-              <ma14:wrappingTextBoxFlag xmlns="" xmlns:m="http://schemas.openxmlformats.org/officeDocument/2006/math" xmlns:a14="http://schemas.microsoft.com/office/drawing/2010/main" xmlns:ma14="http://schemas.microsoft.com/office/mac/drawingml/2011/main" val="1"/>
+              <ma14:wrappingTextBoxFlag xmlns:ma14="http://schemas.microsoft.com/office/mac/drawingml/2011/main" xmlns:a14="http://schemas.microsoft.com/office/drawing/2010/main" xmlns:m="http://schemas.openxmlformats.org/officeDocument/2006/math" xmlns="" val="1"/>
             </a:ext>
           </a:extLst>
         </p:spPr>
@@ -8235,7 +8304,7 @@
           </a:ln>
           <a:extLst>
             <a:ext uri="{C572A759-6A51-4108-AA02-DFA0A04FC94B}">
-              <ma14:wrappingTextBoxFlag xmlns="" xmlns:m="http://schemas.openxmlformats.org/officeDocument/2006/math" xmlns:a14="http://schemas.microsoft.com/office/drawing/2010/main" xmlns:ma14="http://schemas.microsoft.com/office/mac/drawingml/2011/main" val="1"/>
+              <ma14:wrappingTextBoxFlag xmlns:ma14="http://schemas.microsoft.com/office/mac/drawingml/2011/main" xmlns:a14="http://schemas.microsoft.com/office/drawing/2010/main" xmlns:m="http://schemas.openxmlformats.org/officeDocument/2006/math" xmlns="" val="1"/>
             </a:ext>
           </a:extLst>
         </p:spPr>
@@ -8352,7 +8421,7 @@
             <a:effectLst/>
             <a:extLst>
               <a:ext uri="{C572A759-6A51-4108-AA02-DFA0A04FC94B}">
-                <ma14:wrappingTextBoxFlag xmlns="" xmlns:m="http://schemas.openxmlformats.org/officeDocument/2006/math" xmlns:a14="http://schemas.microsoft.com/office/drawing/2010/main" xmlns:ma14="http://schemas.microsoft.com/office/mac/drawingml/2011/main" val="1"/>
+                <ma14:wrappingTextBoxFlag xmlns:ma14="http://schemas.microsoft.com/office/mac/drawingml/2011/main" xmlns:a14="http://schemas.microsoft.com/office/drawing/2010/main" xmlns:m="http://schemas.openxmlformats.org/officeDocument/2006/math" xmlns="" val="1"/>
               </a:ext>
             </a:extLst>
           </p:spPr>
@@ -8452,7 +8521,7 @@
           </a:ln>
           <a:extLst>
             <a:ext uri="{C572A759-6A51-4108-AA02-DFA0A04FC94B}">
-              <ma14:wrappingTextBoxFlag xmlns="" xmlns:m="http://schemas.openxmlformats.org/officeDocument/2006/math" xmlns:a14="http://schemas.microsoft.com/office/drawing/2010/main" xmlns:ma14="http://schemas.microsoft.com/office/mac/drawingml/2011/main" val="1"/>
+              <ma14:wrappingTextBoxFlag xmlns:ma14="http://schemas.microsoft.com/office/mac/drawingml/2011/main" xmlns:a14="http://schemas.microsoft.com/office/drawing/2010/main" xmlns:m="http://schemas.openxmlformats.org/officeDocument/2006/math" xmlns="" val="1"/>
             </a:ext>
           </a:extLst>
         </p:spPr>
@@ -8552,7 +8621,7 @@
           </a:ln>
           <a:extLst>
             <a:ext uri="{C572A759-6A51-4108-AA02-DFA0A04FC94B}">
-              <ma14:wrappingTextBoxFlag xmlns="" xmlns:m="http://schemas.openxmlformats.org/officeDocument/2006/math" xmlns:a14="http://schemas.microsoft.com/office/drawing/2010/main" xmlns:ma14="http://schemas.microsoft.com/office/mac/drawingml/2011/main" val="1"/>
+              <ma14:wrappingTextBoxFlag xmlns:ma14="http://schemas.microsoft.com/office/mac/drawingml/2011/main" xmlns:a14="http://schemas.microsoft.com/office/drawing/2010/main" xmlns:m="http://schemas.openxmlformats.org/officeDocument/2006/math" xmlns="" val="1"/>
             </a:ext>
           </a:extLst>
         </p:spPr>
@@ -8632,7 +8701,7 @@
             <a:effectLst/>
             <a:extLst>
               <a:ext uri="{C572A759-6A51-4108-AA02-DFA0A04FC94B}">
-                <ma14:wrappingTextBoxFlag xmlns="" xmlns:m="http://schemas.openxmlformats.org/officeDocument/2006/math" xmlns:a14="http://schemas.microsoft.com/office/drawing/2010/main" xmlns:ma14="http://schemas.microsoft.com/office/mac/drawingml/2011/main" val="1"/>
+                <ma14:wrappingTextBoxFlag xmlns:ma14="http://schemas.microsoft.com/office/mac/drawingml/2011/main" xmlns:a14="http://schemas.microsoft.com/office/drawing/2010/main" xmlns:m="http://schemas.openxmlformats.org/officeDocument/2006/math" xmlns="" val="1"/>
               </a:ext>
             </a:extLst>
           </p:spPr>
@@ -8732,7 +8801,7 @@
           </a:ln>
           <a:extLst>
             <a:ext uri="{C572A759-6A51-4108-AA02-DFA0A04FC94B}">
-              <ma14:wrappingTextBoxFlag xmlns="" xmlns:m="http://schemas.openxmlformats.org/officeDocument/2006/math" xmlns:a14="http://schemas.microsoft.com/office/drawing/2010/main" xmlns:ma14="http://schemas.microsoft.com/office/mac/drawingml/2011/main" val="1"/>
+              <ma14:wrappingTextBoxFlag xmlns:ma14="http://schemas.microsoft.com/office/mac/drawingml/2011/main" xmlns:a14="http://schemas.microsoft.com/office/drawing/2010/main" xmlns:m="http://schemas.openxmlformats.org/officeDocument/2006/math" xmlns="" val="1"/>
             </a:ext>
           </a:extLst>
         </p:spPr>
@@ -8832,7 +8901,7 @@
           </a:ln>
           <a:extLst>
             <a:ext uri="{C572A759-6A51-4108-AA02-DFA0A04FC94B}">
-              <ma14:wrappingTextBoxFlag xmlns="" xmlns:m="http://schemas.openxmlformats.org/officeDocument/2006/math" xmlns:a14="http://schemas.microsoft.com/office/drawing/2010/main" xmlns:ma14="http://schemas.microsoft.com/office/mac/drawingml/2011/main" val="1"/>
+              <ma14:wrappingTextBoxFlag xmlns:ma14="http://schemas.microsoft.com/office/mac/drawingml/2011/main" xmlns:a14="http://schemas.microsoft.com/office/drawing/2010/main" xmlns:m="http://schemas.openxmlformats.org/officeDocument/2006/math" xmlns="" val="1"/>
             </a:ext>
           </a:extLst>
         </p:spPr>
@@ -9087,7 +9156,7 @@
           </a:ln>
           <a:extLst>
             <a:ext uri="{C572A759-6A51-4108-AA02-DFA0A04FC94B}">
-              <ma14:wrappingTextBoxFlag xmlns="" xmlns:m="http://schemas.openxmlformats.org/officeDocument/2006/math" xmlns:a14="http://schemas.microsoft.com/office/drawing/2010/main" xmlns:ma14="http://schemas.microsoft.com/office/mac/drawingml/2011/main" val="1"/>
+              <ma14:wrappingTextBoxFlag xmlns:ma14="http://schemas.microsoft.com/office/mac/drawingml/2011/main" xmlns:a14="http://schemas.microsoft.com/office/drawing/2010/main" xmlns:m="http://schemas.openxmlformats.org/officeDocument/2006/math" xmlns="" val="1"/>
             </a:ext>
           </a:extLst>
         </p:spPr>
@@ -9763,7 +9832,7 @@
               <a:effectLst/>
               <a:extLst>
                 <a:ext uri="{C572A759-6A51-4108-AA02-DFA0A04FC94B}">
-                  <ma14:wrappingTextBoxFlag xmlns="" xmlns:m="http://schemas.openxmlformats.org/officeDocument/2006/math" xmlns:a14="http://schemas.microsoft.com/office/drawing/2010/main" xmlns:ma14="http://schemas.microsoft.com/office/mac/drawingml/2011/main" val="1"/>
+                  <ma14:wrappingTextBoxFlag xmlns:ma14="http://schemas.microsoft.com/office/mac/drawingml/2011/main" xmlns:a14="http://schemas.microsoft.com/office/drawing/2010/main" xmlns:m="http://schemas.openxmlformats.org/officeDocument/2006/math" xmlns="" val="1"/>
                 </a:ext>
               </a:extLst>
             </p:spPr>
@@ -9923,7 +9992,7 @@
           <a:effectLst/>
           <a:extLst>
             <a:ext uri="{C572A759-6A51-4108-AA02-DFA0A04FC94B}">
-              <ma14:wrappingTextBoxFlag xmlns="" xmlns:m="http://schemas.openxmlformats.org/officeDocument/2006/math" xmlns:a14="http://schemas.microsoft.com/office/drawing/2010/main" xmlns:ma14="http://schemas.microsoft.com/office/mac/drawingml/2011/main" val="1"/>
+              <ma14:wrappingTextBoxFlag xmlns:ma14="http://schemas.microsoft.com/office/mac/drawingml/2011/main" xmlns:a14="http://schemas.microsoft.com/office/drawing/2010/main" xmlns:m="http://schemas.openxmlformats.org/officeDocument/2006/math" xmlns="" val="1"/>
             </a:ext>
           </a:extLst>
         </p:spPr>
@@ -11539,7 +11608,7 @@
           </a:ln>
           <a:extLst>
             <a:ext uri="{C572A759-6A51-4108-AA02-DFA0A04FC94B}">
-              <ma14:wrappingTextBoxFlag xmlns="" xmlns:m="http://schemas.openxmlformats.org/officeDocument/2006/math" xmlns:a14="http://schemas.microsoft.com/office/drawing/2010/main" xmlns:ma14="http://schemas.microsoft.com/office/mac/drawingml/2011/main" val="1"/>
+              <ma14:wrappingTextBoxFlag xmlns:ma14="http://schemas.microsoft.com/office/mac/drawingml/2011/main" xmlns:a14="http://schemas.microsoft.com/office/drawing/2010/main" xmlns:m="http://schemas.openxmlformats.org/officeDocument/2006/math" xmlns="" val="1"/>
             </a:ext>
           </a:extLst>
         </p:spPr>
@@ -11662,7 +11731,7 @@
           </a:ln>
           <a:extLst>
             <a:ext uri="{C572A759-6A51-4108-AA02-DFA0A04FC94B}">
-              <ma14:wrappingTextBoxFlag xmlns="" xmlns:m="http://schemas.openxmlformats.org/officeDocument/2006/math" xmlns:a14="http://schemas.microsoft.com/office/drawing/2010/main" xmlns:ma14="http://schemas.microsoft.com/office/mac/drawingml/2011/main" val="1"/>
+              <ma14:wrappingTextBoxFlag xmlns:ma14="http://schemas.microsoft.com/office/mac/drawingml/2011/main" xmlns:a14="http://schemas.microsoft.com/office/drawing/2010/main" xmlns:m="http://schemas.openxmlformats.org/officeDocument/2006/math" xmlns="" val="1"/>
             </a:ext>
           </a:extLst>
         </p:spPr>
@@ -11765,7 +11834,7 @@
           <a:effectLst/>
           <a:extLst>
             <a:ext uri="{C572A759-6A51-4108-AA02-DFA0A04FC94B}">
-              <ma14:wrappingTextBoxFlag xmlns="" xmlns:m="http://schemas.openxmlformats.org/officeDocument/2006/math" xmlns:a14="http://schemas.microsoft.com/office/drawing/2010/main" xmlns:ma14="http://schemas.microsoft.com/office/mac/drawingml/2011/main" val="1"/>
+              <ma14:wrappingTextBoxFlag xmlns:ma14="http://schemas.microsoft.com/office/mac/drawingml/2011/main" xmlns:a14="http://schemas.microsoft.com/office/drawing/2010/main" xmlns:m="http://schemas.openxmlformats.org/officeDocument/2006/math" xmlns="" val="1"/>
             </a:ext>
           </a:extLst>
         </p:spPr>
@@ -12835,7 +12904,7 @@
             </a:ln>
             <a:extLst>
               <a:ext uri="{C572A759-6A51-4108-AA02-DFA0A04FC94B}">
-                <ma14:wrappingTextBoxFlag xmlns="" xmlns:m="http://schemas.openxmlformats.org/officeDocument/2006/math" xmlns:a14="http://schemas.microsoft.com/office/drawing/2010/main" xmlns:ma14="http://schemas.microsoft.com/office/mac/drawingml/2011/main" val="1"/>
+                <ma14:wrappingTextBoxFlag xmlns:ma14="http://schemas.microsoft.com/office/mac/drawingml/2011/main" xmlns:a14="http://schemas.microsoft.com/office/drawing/2010/main" xmlns:m="http://schemas.openxmlformats.org/officeDocument/2006/math" xmlns="" val="1"/>
               </a:ext>
             </a:extLst>
           </p:spPr>
@@ -12935,7 +13004,7 @@
             </a:ln>
             <a:extLst>
               <a:ext uri="{C572A759-6A51-4108-AA02-DFA0A04FC94B}">
-                <ma14:wrappingTextBoxFlag xmlns="" xmlns:m="http://schemas.openxmlformats.org/officeDocument/2006/math" xmlns:a14="http://schemas.microsoft.com/office/drawing/2010/main" xmlns:ma14="http://schemas.microsoft.com/office/mac/drawingml/2011/main" val="1"/>
+                <ma14:wrappingTextBoxFlag xmlns:ma14="http://schemas.microsoft.com/office/mac/drawingml/2011/main" xmlns:a14="http://schemas.microsoft.com/office/drawing/2010/main" xmlns:m="http://schemas.openxmlformats.org/officeDocument/2006/math" xmlns="" val="1"/>
               </a:ext>
             </a:extLst>
           </p:spPr>
@@ -14024,7 +14093,7 @@
             </a:ln>
             <a:extLst>
               <a:ext uri="{C572A759-6A51-4108-AA02-DFA0A04FC94B}">
-                <ma14:wrappingTextBoxFlag xmlns="" xmlns:m="http://schemas.openxmlformats.org/officeDocument/2006/math" xmlns:a14="http://schemas.microsoft.com/office/drawing/2010/main" xmlns:ma14="http://schemas.microsoft.com/office/mac/drawingml/2011/main" val="1"/>
+                <ma14:wrappingTextBoxFlag xmlns:ma14="http://schemas.microsoft.com/office/mac/drawingml/2011/main" xmlns:a14="http://schemas.microsoft.com/office/drawing/2010/main" xmlns:m="http://schemas.openxmlformats.org/officeDocument/2006/math" xmlns="" val="1"/>
               </a:ext>
             </a:extLst>
           </p:spPr>
@@ -14124,7 +14193,7 @@
             </a:ln>
             <a:extLst>
               <a:ext uri="{C572A759-6A51-4108-AA02-DFA0A04FC94B}">
-                <ma14:wrappingTextBoxFlag xmlns="" xmlns:m="http://schemas.openxmlformats.org/officeDocument/2006/math" xmlns:a14="http://schemas.microsoft.com/office/drawing/2010/main" xmlns:ma14="http://schemas.microsoft.com/office/mac/drawingml/2011/main" val="1"/>
+                <ma14:wrappingTextBoxFlag xmlns:ma14="http://schemas.microsoft.com/office/mac/drawingml/2011/main" xmlns:a14="http://schemas.microsoft.com/office/drawing/2010/main" xmlns:m="http://schemas.openxmlformats.org/officeDocument/2006/math" xmlns="" val="1"/>
               </a:ext>
             </a:extLst>
           </p:spPr>
@@ -14499,7 +14568,7 @@
             </a:ln>
             <a:extLst>
               <a:ext uri="{C572A759-6A51-4108-AA02-DFA0A04FC94B}">
-                <ma14:wrappingTextBoxFlag xmlns="" xmlns:m="http://schemas.openxmlformats.org/officeDocument/2006/math" xmlns:a14="http://schemas.microsoft.com/office/drawing/2010/main" xmlns:ma14="http://schemas.microsoft.com/office/mac/drawingml/2011/main" val="1"/>
+                <ma14:wrappingTextBoxFlag xmlns:ma14="http://schemas.microsoft.com/office/mac/drawingml/2011/main" xmlns:a14="http://schemas.microsoft.com/office/drawing/2010/main" xmlns:m="http://schemas.openxmlformats.org/officeDocument/2006/math" xmlns="" val="1"/>
               </a:ext>
             </a:extLst>
           </p:spPr>
@@ -14599,7 +14668,7 @@
             </a:ln>
             <a:extLst>
               <a:ext uri="{C572A759-6A51-4108-AA02-DFA0A04FC94B}">
-                <ma14:wrappingTextBoxFlag xmlns="" xmlns:m="http://schemas.openxmlformats.org/officeDocument/2006/math" xmlns:a14="http://schemas.microsoft.com/office/drawing/2010/main" xmlns:ma14="http://schemas.microsoft.com/office/mac/drawingml/2011/main" val="1"/>
+                <ma14:wrappingTextBoxFlag xmlns:ma14="http://schemas.microsoft.com/office/mac/drawingml/2011/main" xmlns:a14="http://schemas.microsoft.com/office/drawing/2010/main" xmlns:m="http://schemas.openxmlformats.org/officeDocument/2006/math" xmlns="" val="1"/>
               </a:ext>
             </a:extLst>
           </p:spPr>
@@ -15269,7 +15338,7 @@
             </a:ln>
             <a:extLst>
               <a:ext uri="{C572A759-6A51-4108-AA02-DFA0A04FC94B}">
-                <ma14:wrappingTextBoxFlag xmlns="" xmlns:m="http://schemas.openxmlformats.org/officeDocument/2006/math" xmlns:a14="http://schemas.microsoft.com/office/drawing/2010/main" xmlns:ma14="http://schemas.microsoft.com/office/mac/drawingml/2011/main" val="1"/>
+                <ma14:wrappingTextBoxFlag xmlns:ma14="http://schemas.microsoft.com/office/mac/drawingml/2011/main" xmlns:a14="http://schemas.microsoft.com/office/drawing/2010/main" xmlns:m="http://schemas.openxmlformats.org/officeDocument/2006/math" xmlns="" val="1"/>
               </a:ext>
             </a:extLst>
           </p:spPr>
@@ -15369,7 +15438,7 @@
             </a:ln>
             <a:extLst>
               <a:ext uri="{C572A759-6A51-4108-AA02-DFA0A04FC94B}">
-                <ma14:wrappingTextBoxFlag xmlns="" xmlns:m="http://schemas.openxmlformats.org/officeDocument/2006/math" xmlns:a14="http://schemas.microsoft.com/office/drawing/2010/main" xmlns:ma14="http://schemas.microsoft.com/office/mac/drawingml/2011/main" val="1"/>
+                <ma14:wrappingTextBoxFlag xmlns:ma14="http://schemas.microsoft.com/office/mac/drawingml/2011/main" xmlns:a14="http://schemas.microsoft.com/office/drawing/2010/main" xmlns:m="http://schemas.openxmlformats.org/officeDocument/2006/math" xmlns="" val="1"/>
               </a:ext>
             </a:extLst>
           </p:spPr>
@@ -15669,7 +15738,7 @@
             </a:ln>
             <a:extLst>
               <a:ext uri="{C572A759-6A51-4108-AA02-DFA0A04FC94B}">
-                <ma14:wrappingTextBoxFlag xmlns="" xmlns:m="http://schemas.openxmlformats.org/officeDocument/2006/math" xmlns:a14="http://schemas.microsoft.com/office/drawing/2010/main" xmlns:ma14="http://schemas.microsoft.com/office/mac/drawingml/2011/main" val="1"/>
+                <ma14:wrappingTextBoxFlag xmlns:ma14="http://schemas.microsoft.com/office/mac/drawingml/2011/main" xmlns:a14="http://schemas.microsoft.com/office/drawing/2010/main" xmlns:m="http://schemas.openxmlformats.org/officeDocument/2006/math" xmlns="" val="1"/>
               </a:ext>
             </a:extLst>
           </p:spPr>
@@ -15769,7 +15838,7 @@
             </a:ln>
             <a:extLst>
               <a:ext uri="{C572A759-6A51-4108-AA02-DFA0A04FC94B}">
-                <ma14:wrappingTextBoxFlag xmlns="" xmlns:m="http://schemas.openxmlformats.org/officeDocument/2006/math" xmlns:a14="http://schemas.microsoft.com/office/drawing/2010/main" xmlns:ma14="http://schemas.microsoft.com/office/mac/drawingml/2011/main" val="1"/>
+                <ma14:wrappingTextBoxFlag xmlns:ma14="http://schemas.microsoft.com/office/mac/drawingml/2011/main" xmlns:a14="http://schemas.microsoft.com/office/drawing/2010/main" xmlns:m="http://schemas.openxmlformats.org/officeDocument/2006/math" xmlns="" val="1"/>
               </a:ext>
             </a:extLst>
           </p:spPr>
@@ -16118,7 +16187,7 @@
             </a:ln>
             <a:extLst>
               <a:ext uri="{C572A759-6A51-4108-AA02-DFA0A04FC94B}">
-                <ma14:wrappingTextBoxFlag xmlns="" xmlns:m="http://schemas.openxmlformats.org/officeDocument/2006/math" xmlns:a14="http://schemas.microsoft.com/office/drawing/2010/main" xmlns:ma14="http://schemas.microsoft.com/office/mac/drawingml/2011/main" val="1"/>
+                <ma14:wrappingTextBoxFlag xmlns:ma14="http://schemas.microsoft.com/office/mac/drawingml/2011/main" xmlns:a14="http://schemas.microsoft.com/office/drawing/2010/main" xmlns:m="http://schemas.openxmlformats.org/officeDocument/2006/math" xmlns="" val="1"/>
               </a:ext>
             </a:extLst>
           </p:spPr>
@@ -16218,7 +16287,7 @@
             </a:ln>
             <a:extLst>
               <a:ext uri="{C572A759-6A51-4108-AA02-DFA0A04FC94B}">
-                <ma14:wrappingTextBoxFlag xmlns="" xmlns:m="http://schemas.openxmlformats.org/officeDocument/2006/math" xmlns:a14="http://schemas.microsoft.com/office/drawing/2010/main" xmlns:ma14="http://schemas.microsoft.com/office/mac/drawingml/2011/main" val="1"/>
+                <ma14:wrappingTextBoxFlag xmlns:ma14="http://schemas.microsoft.com/office/mac/drawingml/2011/main" xmlns:a14="http://schemas.microsoft.com/office/drawing/2010/main" xmlns:m="http://schemas.openxmlformats.org/officeDocument/2006/math" xmlns="" val="1"/>
               </a:ext>
             </a:extLst>
           </p:spPr>
@@ -16546,7 +16615,7 @@
             </a:ln>
             <a:extLst>
               <a:ext uri="{C572A759-6A51-4108-AA02-DFA0A04FC94B}">
-                <ma14:wrappingTextBoxFlag xmlns="" xmlns:m="http://schemas.openxmlformats.org/officeDocument/2006/math" xmlns:a14="http://schemas.microsoft.com/office/drawing/2010/main" xmlns:ma14="http://schemas.microsoft.com/office/mac/drawingml/2011/main" val="1"/>
+                <ma14:wrappingTextBoxFlag xmlns:ma14="http://schemas.microsoft.com/office/mac/drawingml/2011/main" xmlns:a14="http://schemas.microsoft.com/office/drawing/2010/main" xmlns:m="http://schemas.openxmlformats.org/officeDocument/2006/math" xmlns="" val="1"/>
               </a:ext>
             </a:extLst>
           </p:spPr>
@@ -16669,7 +16738,7 @@
             </a:ln>
             <a:extLst>
               <a:ext uri="{C572A759-6A51-4108-AA02-DFA0A04FC94B}">
-                <ma14:wrappingTextBoxFlag xmlns="" xmlns:m="http://schemas.openxmlformats.org/officeDocument/2006/math" xmlns:a14="http://schemas.microsoft.com/office/drawing/2010/main" xmlns:ma14="http://schemas.microsoft.com/office/mac/drawingml/2011/main" val="1"/>
+                <ma14:wrappingTextBoxFlag xmlns:ma14="http://schemas.microsoft.com/office/mac/drawingml/2011/main" xmlns:a14="http://schemas.microsoft.com/office/drawing/2010/main" xmlns:m="http://schemas.openxmlformats.org/officeDocument/2006/math" xmlns="" val="1"/>
               </a:ext>
             </a:extLst>
           </p:spPr>

</xml_diff>